<commit_message>
[Materials] Rename submeshes to meshes, update images
</commit_message>
<xml_diff>
--- a/en/manual/graphics/materials/media/material slots.pptx
+++ b/en/manual/graphics/materials/media/material slots.pptx
@@ -5,10 +5,8 @@
     <p:sldMasterId id="2147483648" r:id="rId1"/>
   </p:sldMasterIdLst>
   <p:sldIdLst>
-    <p:sldId id="256" r:id="rId2"/>
-    <p:sldId id="257" r:id="rId3"/>
-    <p:sldId id="258" r:id="rId4"/>
-    <p:sldId id="259" r:id="rId5"/>
+    <p:sldId id="257" r:id="rId2"/>
+    <p:sldId id="258" r:id="rId3"/>
   </p:sldIdLst>
   <p:sldSz cx="12192000" cy="6858000"/>
   <p:notesSz cx="6858000" cy="9144000"/>
@@ -107,7 +105,16 @@
       </a:defRPr>
     </a:lvl9pPr>
   </p:defaultTextStyle>
+  <p:extLst>
+    <p:ext uri="{EFAFB233-063F-42B5-8137-9DF3F51BA10A}">
+      <p15:sldGuideLst xmlns:p15="http://schemas.microsoft.com/office/powerpoint/2012/main"/>
+    </p:ext>
+  </p:extLst>
 </p:presentation>
+</file>
+
+<file path=ppt/revisionInfo.xml><?xml version="1.0" encoding="utf-8"?>
+<p1510:revInfo xmlns:a="http://schemas.openxmlformats.org/drawingml/2006/main" xmlns:r="http://schemas.openxmlformats.org/officeDocument/2006/relationships" xmlns:p1510="http://schemas.microsoft.com/office/powerpoint/2015/10/main"/>
 </file>
 
 <file path=ppt/slideLayouts/slideLayout1.xml><?xml version="1.0" encoding="utf-8"?>
@@ -259,7 +266,7 @@
           <a:p>
             <a:fld id="{8CD96287-FBF6-4955-AFE7-5FCFD584C15B}" type="datetimeFigureOut">
               <a:rPr lang="en-GB" smtClean="0"/>
-              <a:t>30/01/2018</a:t>
+              <a:t>01/02/2018</a:t>
             </a:fld>
             <a:endParaRPr lang="en-GB"/>
           </a:p>
@@ -459,7 +466,7 @@
           <a:p>
             <a:fld id="{8CD96287-FBF6-4955-AFE7-5FCFD584C15B}" type="datetimeFigureOut">
               <a:rPr lang="en-GB" smtClean="0"/>
-              <a:t>30/01/2018</a:t>
+              <a:t>01/02/2018</a:t>
             </a:fld>
             <a:endParaRPr lang="en-GB"/>
           </a:p>
@@ -669,7 +676,7 @@
           <a:p>
             <a:fld id="{8CD96287-FBF6-4955-AFE7-5FCFD584C15B}" type="datetimeFigureOut">
               <a:rPr lang="en-GB" smtClean="0"/>
-              <a:t>30/01/2018</a:t>
+              <a:t>01/02/2018</a:t>
             </a:fld>
             <a:endParaRPr lang="en-GB"/>
           </a:p>
@@ -869,7 +876,7 @@
           <a:p>
             <a:fld id="{8CD96287-FBF6-4955-AFE7-5FCFD584C15B}" type="datetimeFigureOut">
               <a:rPr lang="en-GB" smtClean="0"/>
-              <a:t>30/01/2018</a:t>
+              <a:t>01/02/2018</a:t>
             </a:fld>
             <a:endParaRPr lang="en-GB"/>
           </a:p>
@@ -1145,7 +1152,7 @@
           <a:p>
             <a:fld id="{8CD96287-FBF6-4955-AFE7-5FCFD584C15B}" type="datetimeFigureOut">
               <a:rPr lang="en-GB" smtClean="0"/>
-              <a:t>30/01/2018</a:t>
+              <a:t>01/02/2018</a:t>
             </a:fld>
             <a:endParaRPr lang="en-GB"/>
           </a:p>
@@ -1413,7 +1420,7 @@
           <a:p>
             <a:fld id="{8CD96287-FBF6-4955-AFE7-5FCFD584C15B}" type="datetimeFigureOut">
               <a:rPr lang="en-GB" smtClean="0"/>
-              <a:t>30/01/2018</a:t>
+              <a:t>01/02/2018</a:t>
             </a:fld>
             <a:endParaRPr lang="en-GB"/>
           </a:p>
@@ -1828,7 +1835,7 @@
           <a:p>
             <a:fld id="{8CD96287-FBF6-4955-AFE7-5FCFD584C15B}" type="datetimeFigureOut">
               <a:rPr lang="en-GB" smtClean="0"/>
-              <a:t>30/01/2018</a:t>
+              <a:t>01/02/2018</a:t>
             </a:fld>
             <a:endParaRPr lang="en-GB"/>
           </a:p>
@@ -1970,7 +1977,7 @@
           <a:p>
             <a:fld id="{8CD96287-FBF6-4955-AFE7-5FCFD584C15B}" type="datetimeFigureOut">
               <a:rPr lang="en-GB" smtClean="0"/>
-              <a:t>30/01/2018</a:t>
+              <a:t>01/02/2018</a:t>
             </a:fld>
             <a:endParaRPr lang="en-GB"/>
           </a:p>
@@ -2083,7 +2090,7 @@
           <a:p>
             <a:fld id="{8CD96287-FBF6-4955-AFE7-5FCFD584C15B}" type="datetimeFigureOut">
               <a:rPr lang="en-GB" smtClean="0"/>
-              <a:t>30/01/2018</a:t>
+              <a:t>01/02/2018</a:t>
             </a:fld>
             <a:endParaRPr lang="en-GB"/>
           </a:p>
@@ -2396,7 +2403,7 @@
           <a:p>
             <a:fld id="{8CD96287-FBF6-4955-AFE7-5FCFD584C15B}" type="datetimeFigureOut">
               <a:rPr lang="en-GB" smtClean="0"/>
-              <a:t>30/01/2018</a:t>
+              <a:t>01/02/2018</a:t>
             </a:fld>
             <a:endParaRPr lang="en-GB"/>
           </a:p>
@@ -2685,7 +2692,7 @@
           <a:p>
             <a:fld id="{8CD96287-FBF6-4955-AFE7-5FCFD584C15B}" type="datetimeFigureOut">
               <a:rPr lang="en-GB" smtClean="0"/>
-              <a:t>30/01/2018</a:t>
+              <a:t>01/02/2018</a:t>
             </a:fld>
             <a:endParaRPr lang="en-GB"/>
           </a:p>
@@ -2928,7 +2935,7 @@
           <a:p>
             <a:fld id="{8CD96287-FBF6-4955-AFE7-5FCFD584C15B}" type="datetimeFigureOut">
               <a:rPr lang="en-GB" smtClean="0"/>
-              <a:t>30/01/2018</a:t>
+              <a:t>01/02/2018</a:t>
             </a:fld>
             <a:endParaRPr lang="en-GB"/>
           </a:p>
@@ -3345,33 +3352,36 @@
           <a:chExt cx="0" cy="0"/>
         </a:xfrm>
       </p:grpSpPr>
-      <p:sp>
-        <p:nvSpPr>
-          <p:cNvPr id="57" name="Rectangle: Rounded Corners 56">
-            <a:extLst>
-              <a:ext uri="{FF2B5EF4-FFF2-40B4-BE49-F238E27FC236}">
-                <a16:creationId xmlns:a16="http://schemas.microsoft.com/office/drawing/2014/main" id="{51B4C998-2287-4B53-A284-DF7CBBC67165}"/>
-              </a:ext>
-            </a:extLst>
-          </p:cNvPr>
-          <p:cNvSpPr/>
+      <p:cxnSp>
+        <p:nvCxnSpPr>
+          <p:cNvPr id="3" name="Straight Connector 2">
+            <a:extLst>
+              <a:ext uri="{FF2B5EF4-FFF2-40B4-BE49-F238E27FC236}">
+                <a16:creationId xmlns:a16="http://schemas.microsoft.com/office/drawing/2014/main" id="{DAE4373B-9ABF-4BB6-B211-1CC224013FDC}"/>
+              </a:ext>
+            </a:extLst>
+          </p:cNvPr>
+          <p:cNvCxnSpPr>
+            <a:cxnSpLocks/>
+          </p:cNvCxnSpPr>
           <p:nvPr/>
-        </p:nvSpPr>
-        <p:spPr>
-          <a:xfrm>
-            <a:off x="6146800" y="711200"/>
-            <a:ext cx="5372100" cy="5524500"/>
-          </a:xfrm>
-          <a:prstGeom prst="roundRect">
+        </p:nvCxnSpPr>
+        <p:spPr>
+          <a:xfrm>
+            <a:off x="6319252" y="1044529"/>
+            <a:ext cx="0" cy="5156200"/>
+          </a:xfrm>
+          <a:prstGeom prst="line">
             <a:avLst/>
           </a:prstGeom>
-          <a:solidFill>
-            <a:srgbClr val="BCD6EE">
-              <a:alpha val="49804"/>
-            </a:srgbClr>
-          </a:solidFill>
-          <a:ln>
-            <a:noFill/>
+          <a:ln w="9525" cap="flat" cmpd="sng" algn="ctr">
+            <a:solidFill>
+              <a:schemeClr val="accent6"/>
+            </a:solidFill>
+            <a:prstDash val="dash"/>
+            <a:round/>
+            <a:headEnd type="none" w="med" len="med"/>
+            <a:tailEnd type="none" w="med" len="med"/>
           </a:ln>
         </p:spPr>
         <p:style>
@@ -3385,24 +3395,16 @@
             <a:scrgbClr r="0" g="0" b="0"/>
           </a:effectRef>
           <a:fontRef idx="minor">
-            <a:schemeClr val="lt1"/>
+            <a:schemeClr val="tx1"/>
           </a:fontRef>
         </p:style>
-        <p:txBody>
-          <a:bodyPr rtlCol="0" anchor="ctr"/>
-          <a:lstStyle/>
-          <a:p>
-            <a:pPr algn="ctr"/>
-            <a:endParaRPr lang="en-GB"/>
-          </a:p>
-        </p:txBody>
-      </p:sp>
-      <p:sp>
-        <p:nvSpPr>
-          <p:cNvPr id="56" name="Rectangle: Rounded Corners 55">
-            <a:extLst>
-              <a:ext uri="{FF2B5EF4-FFF2-40B4-BE49-F238E27FC236}">
-                <a16:creationId xmlns:a16="http://schemas.microsoft.com/office/drawing/2014/main" id="{D37559BE-EEDC-4A91-91AC-D61668528A12}"/>
+      </p:cxnSp>
+      <p:sp>
+        <p:nvSpPr>
+          <p:cNvPr id="9" name="Rectangle: Rounded Corners 8">
+            <a:extLst>
+              <a:ext uri="{FF2B5EF4-FFF2-40B4-BE49-F238E27FC236}">
+                <a16:creationId xmlns:a16="http://schemas.microsoft.com/office/drawing/2014/main" id="{7FD159BF-D1EE-4C7E-B8BB-0CCD1F7EA0DE}"/>
               </a:ext>
             </a:extLst>
           </p:cNvPr>
@@ -3411,60 +3413,8 @@
         </p:nvSpPr>
         <p:spPr>
           <a:xfrm>
-            <a:off x="711868" y="711200"/>
-            <a:ext cx="7517731" cy="5524500"/>
-          </a:xfrm>
-          <a:prstGeom prst="roundRect">
-            <a:avLst/>
-          </a:prstGeom>
-          <a:solidFill>
-            <a:srgbClr val="F5FFCF">
-              <a:alpha val="49804"/>
-            </a:srgbClr>
-          </a:solidFill>
-          <a:ln>
-            <a:noFill/>
-          </a:ln>
-        </p:spPr>
-        <p:style>
-          <a:lnRef idx="0">
-            <a:scrgbClr r="0" g="0" b="0"/>
-          </a:lnRef>
-          <a:fillRef idx="0">
-            <a:scrgbClr r="0" g="0" b="0"/>
-          </a:fillRef>
-          <a:effectRef idx="0">
-            <a:scrgbClr r="0" g="0" b="0"/>
-          </a:effectRef>
-          <a:fontRef idx="minor">
-            <a:schemeClr val="lt1"/>
-          </a:fontRef>
-        </p:style>
-        <p:txBody>
-          <a:bodyPr rtlCol="0" anchor="ctr"/>
-          <a:lstStyle/>
-          <a:p>
-            <a:pPr algn="ctr"/>
-            <a:endParaRPr lang="en-GB"/>
-          </a:p>
-        </p:txBody>
-      </p:sp>
-      <p:sp>
-        <p:nvSpPr>
-          <p:cNvPr id="9" name="Rectangle: Rounded Corners 8">
-            <a:extLst>
-              <a:ext uri="{FF2B5EF4-FFF2-40B4-BE49-F238E27FC236}">
-                <a16:creationId xmlns:a16="http://schemas.microsoft.com/office/drawing/2014/main" id="{7FD159BF-D1EE-4C7E-B8BB-0CCD1F7EA0DE}"/>
-              </a:ext>
-            </a:extLst>
-          </p:cNvPr>
-          <p:cNvSpPr/>
-          <p:nvPr/>
-        </p:nvSpPr>
-        <p:spPr>
-          <a:xfrm>
-            <a:off x="1331494" y="1673059"/>
-            <a:ext cx="1692442" cy="513346"/>
+            <a:off x="1844842" y="1673059"/>
+            <a:ext cx="1179094" cy="513346"/>
           </a:xfrm>
           <a:prstGeom prst="roundRect">
             <a:avLst/>
@@ -3498,20 +3448,12 @@
           <a:p>
             <a:pPr algn="ctr"/>
             <a:r>
-              <a:rPr lang="en-GB" b="1" dirty="0" err="1">
-                <a:solidFill>
-                  <a:schemeClr val="tx2"/>
-                </a:solidFill>
-              </a:rPr>
-              <a:t>Submesh</a:t>
-            </a:r>
-            <a:r>
               <a:rPr lang="en-GB" b="1" dirty="0">
                 <a:solidFill>
                   <a:schemeClr val="tx2"/>
                 </a:solidFill>
               </a:rPr>
-              <a:t> 1</a:t>
+              <a:t>Mesh 1</a:t>
             </a:r>
           </a:p>
         </p:txBody>
@@ -3530,8 +3472,8 @@
         </p:nvSpPr>
         <p:spPr>
           <a:xfrm>
-            <a:off x="1331495" y="2526665"/>
-            <a:ext cx="1692442" cy="513346"/>
+            <a:off x="1844841" y="2526665"/>
+            <a:ext cx="1179095" cy="513346"/>
           </a:xfrm>
           <a:prstGeom prst="roundRect">
             <a:avLst/>
@@ -3565,20 +3507,12 @@
           <a:p>
             <a:pPr algn="ctr"/>
             <a:r>
-              <a:rPr lang="en-GB" b="1" dirty="0" err="1">
-                <a:solidFill>
-                  <a:schemeClr val="tx2"/>
-                </a:solidFill>
-              </a:rPr>
-              <a:t>Submesh</a:t>
-            </a:r>
-            <a:r>
               <a:rPr lang="en-GB" b="1" dirty="0">
                 <a:solidFill>
                   <a:schemeClr val="tx2"/>
                 </a:solidFill>
               </a:rPr>
-              <a:t> 2</a:t>
+              <a:t>Mesh 2</a:t>
             </a:r>
           </a:p>
         </p:txBody>
@@ -3597,8 +3531,8 @@
         </p:nvSpPr>
         <p:spPr>
           <a:xfrm>
-            <a:off x="1331494" y="3375625"/>
-            <a:ext cx="1692443" cy="513346"/>
+            <a:off x="1844841" y="3375625"/>
+            <a:ext cx="1179096" cy="513346"/>
           </a:xfrm>
           <a:prstGeom prst="roundRect">
             <a:avLst/>
@@ -3632,20 +3566,12 @@
           <a:p>
             <a:pPr algn="ctr"/>
             <a:r>
-              <a:rPr lang="en-GB" b="1" dirty="0" err="1">
-                <a:solidFill>
-                  <a:schemeClr val="tx2"/>
-                </a:solidFill>
-              </a:rPr>
-              <a:t>Submesh</a:t>
-            </a:r>
-            <a:r>
               <a:rPr lang="en-GB" b="1" dirty="0">
                 <a:solidFill>
                   <a:schemeClr val="tx2"/>
                 </a:solidFill>
               </a:rPr>
-              <a:t> 3</a:t>
+              <a:t>Mesh 3</a:t>
             </a:r>
           </a:p>
         </p:txBody>
@@ -3664,8 +3590,8 @@
         </p:nvSpPr>
         <p:spPr>
           <a:xfrm>
-            <a:off x="1331495" y="4229231"/>
-            <a:ext cx="1692442" cy="513346"/>
+            <a:off x="1844841" y="4229231"/>
+            <a:ext cx="1179096" cy="513346"/>
           </a:xfrm>
           <a:prstGeom prst="roundRect">
             <a:avLst/>
@@ -3699,20 +3625,12 @@
           <a:p>
             <a:pPr algn="ctr"/>
             <a:r>
-              <a:rPr lang="en-GB" b="1" dirty="0" err="1">
-                <a:solidFill>
-                  <a:schemeClr val="tx2"/>
-                </a:solidFill>
-              </a:rPr>
-              <a:t>Submesh</a:t>
-            </a:r>
-            <a:r>
               <a:rPr lang="en-GB" b="1" dirty="0">
                 <a:solidFill>
                   <a:schemeClr val="tx2"/>
                 </a:solidFill>
               </a:rPr>
-              <a:t> 4</a:t>
+              <a:t>Mesh 4</a:t>
             </a:r>
           </a:p>
         </p:txBody>
@@ -3731,8 +3649,8 @@
         </p:nvSpPr>
         <p:spPr>
           <a:xfrm>
-            <a:off x="1331495" y="5078191"/>
-            <a:ext cx="1692442" cy="513346"/>
+            <a:off x="1844841" y="5078191"/>
+            <a:ext cx="1179096" cy="513346"/>
           </a:xfrm>
           <a:prstGeom prst="roundRect">
             <a:avLst/>
@@ -3766,20 +3684,12 @@
           <a:p>
             <a:pPr algn="ctr"/>
             <a:r>
-              <a:rPr lang="en-GB" b="1" dirty="0" err="1">
-                <a:solidFill>
-                  <a:schemeClr val="tx2"/>
-                </a:solidFill>
-              </a:rPr>
-              <a:t>Submesh</a:t>
-            </a:r>
-            <a:r>
               <a:rPr lang="en-GB" b="1" dirty="0">
                 <a:solidFill>
                   <a:schemeClr val="tx2"/>
                 </a:solidFill>
               </a:rPr>
-              <a:t> 5</a:t>
+              <a:t>Mesh 5</a:t>
             </a:r>
           </a:p>
         </p:txBody>
@@ -3798,7 +3708,7 @@
         </p:nvSpPr>
         <p:spPr>
           <a:xfrm>
-            <a:off x="6292516" y="1673059"/>
+            <a:off x="5446294" y="1673059"/>
             <a:ext cx="1692442" cy="513346"/>
           </a:xfrm>
           <a:prstGeom prst="roundRect">
@@ -3857,7 +3767,7 @@
         </p:nvSpPr>
         <p:spPr>
           <a:xfrm>
-            <a:off x="6292516" y="3375625"/>
+            <a:off x="5446294" y="3375625"/>
             <a:ext cx="1692442" cy="513346"/>
           </a:xfrm>
           <a:prstGeom prst="roundRect">
@@ -3916,7 +3826,7 @@
         </p:nvSpPr>
         <p:spPr>
           <a:xfrm>
-            <a:off x="6292516" y="5078191"/>
+            <a:off x="5446294" y="5078191"/>
             <a:ext cx="1692442" cy="513346"/>
           </a:xfrm>
           <a:prstGeom prst="roundRect">
@@ -3975,7 +3885,7 @@
         </p:nvSpPr>
         <p:spPr>
           <a:xfrm>
-            <a:off x="9348538" y="1673059"/>
+            <a:off x="8485607" y="1673059"/>
             <a:ext cx="1548062" cy="513346"/>
           </a:xfrm>
           <a:prstGeom prst="roundRect">
@@ -4034,7 +3944,7 @@
         </p:nvSpPr>
         <p:spPr>
           <a:xfrm>
-            <a:off x="9348538" y="3375625"/>
+            <a:off x="8485607" y="3375625"/>
             <a:ext cx="1548062" cy="513346"/>
           </a:xfrm>
           <a:prstGeom prst="roundRect">
@@ -4093,7 +4003,7 @@
         </p:nvSpPr>
         <p:spPr>
           <a:xfrm>
-            <a:off x="9348538" y="5078191"/>
+            <a:off x="8485607" y="5078191"/>
             <a:ext cx="1548062" cy="513346"/>
           </a:xfrm>
           <a:prstGeom prst="roundRect">
@@ -4157,7 +4067,7 @@
         <p:spPr>
           <a:xfrm>
             <a:off x="3023936" y="1929732"/>
-            <a:ext cx="3268580" cy="1702566"/>
+            <a:ext cx="2422358" cy="1702566"/>
           </a:xfrm>
           <a:prstGeom prst="line">
             <a:avLst/>
@@ -4190,14 +4100,15 @@
           </p:cNvPr>
           <p:cNvCxnSpPr>
             <a:cxnSpLocks/>
+            <a:stCxn id="10" idx="3"/>
             <a:endCxn id="20" idx="1"/>
           </p:cNvCxnSpPr>
           <p:nvPr/>
         </p:nvCxnSpPr>
         <p:spPr>
           <a:xfrm>
-            <a:off x="3023936" y="2781015"/>
-            <a:ext cx="3268580" cy="2553849"/>
+            <a:off x="3023936" y="2783338"/>
+            <a:ext cx="2422358" cy="2551526"/>
           </a:xfrm>
           <a:prstGeom prst="line">
             <a:avLst/>
@@ -4238,7 +4149,7 @@
         <p:spPr>
           <a:xfrm>
             <a:off x="3023937" y="5334864"/>
-            <a:ext cx="3268579" cy="0"/>
+            <a:ext cx="2422357" cy="0"/>
           </a:xfrm>
           <a:prstGeom prst="line">
             <a:avLst/>
@@ -4277,8 +4188,8 @@
         </p:nvCxnSpPr>
         <p:spPr>
           <a:xfrm flipV="1">
-            <a:off x="3023937" y="1929732"/>
-            <a:ext cx="3268579" cy="2556172"/>
+            <a:off x="3023936" y="1929732"/>
+            <a:ext cx="2422358" cy="2501084"/>
           </a:xfrm>
           <a:prstGeom prst="line">
             <a:avLst/>
@@ -4311,14 +4222,15 @@
           </p:cNvPr>
           <p:cNvCxnSpPr>
             <a:cxnSpLocks/>
+            <a:stCxn id="11" idx="3"/>
             <a:endCxn id="19" idx="1"/>
           </p:cNvCxnSpPr>
           <p:nvPr/>
         </p:nvCxnSpPr>
         <p:spPr>
           <a:xfrm>
-            <a:off x="3023936" y="3632298"/>
-            <a:ext cx="3268580" cy="0"/>
+            <a:off x="3023937" y="3632298"/>
+            <a:ext cx="2422357" cy="0"/>
           </a:xfrm>
           <a:prstGeom prst="line">
             <a:avLst/>
@@ -4358,8 +4270,8 @@
         </p:nvCxnSpPr>
         <p:spPr>
           <a:xfrm>
-            <a:off x="7984958" y="1929732"/>
-            <a:ext cx="1363580" cy="0"/>
+            <a:off x="7138736" y="1929732"/>
+            <a:ext cx="1346871" cy="0"/>
           </a:xfrm>
           <a:prstGeom prst="line">
             <a:avLst/>
@@ -4397,8 +4309,8 @@
         </p:nvCxnSpPr>
         <p:spPr>
           <a:xfrm>
-            <a:off x="7984958" y="3632298"/>
-            <a:ext cx="1363580" cy="0"/>
+            <a:off x="7138736" y="3632298"/>
+            <a:ext cx="1346871" cy="0"/>
           </a:xfrm>
           <a:prstGeom prst="line">
             <a:avLst/>
@@ -4436,8 +4348,8 @@
         </p:nvCxnSpPr>
         <p:spPr>
           <a:xfrm>
-            <a:off x="7984958" y="5334864"/>
-            <a:ext cx="1363580" cy="0"/>
+            <a:off x="7138736" y="5334864"/>
+            <a:ext cx="1346871" cy="0"/>
           </a:xfrm>
           <a:prstGeom prst="line">
             <a:avLst/>
@@ -4472,7 +4384,7 @@
         </p:nvSpPr>
         <p:spPr>
           <a:xfrm>
-            <a:off x="1282700" y="890553"/>
+            <a:off x="1844841" y="990203"/>
             <a:ext cx="5226384" cy="461665"/>
           </a:xfrm>
           <a:prstGeom prst="rect">
@@ -4507,7 +4419,7 @@
         </p:nvSpPr>
         <p:spPr>
           <a:xfrm>
-            <a:off x="9226550" y="890553"/>
+            <a:off x="8381334" y="893166"/>
             <a:ext cx="3987800" cy="461665"/>
           </a:xfrm>
           <a:prstGeom prst="rect">
@@ -4531,7 +4443,7 @@
     </p:spTree>
     <p:extLst>
       <p:ext uri="{BB962C8B-B14F-4D97-AF65-F5344CB8AC3E}">
-        <p14:creationId xmlns:p14="http://schemas.microsoft.com/office/powerpoint/2010/main" val="595706495"/>
+        <p14:creationId xmlns:p14="http://schemas.microsoft.com/office/powerpoint/2010/main" val="4223368684"/>
       </p:ext>
     </p:extLst>
   </p:cSld>
@@ -4558,12 +4470,1198 @@
           <a:chExt cx="0" cy="0"/>
         </a:xfrm>
       </p:grpSpPr>
+      <p:sp>
+        <p:nvSpPr>
+          <p:cNvPr id="14" name="Rectangle: Rounded Corners 13">
+            <a:extLst>
+              <a:ext uri="{FF2B5EF4-FFF2-40B4-BE49-F238E27FC236}">
+                <a16:creationId xmlns:a16="http://schemas.microsoft.com/office/drawing/2014/main" id="{CDF70A4A-AD09-4F68-9E76-59CFFBD99214}"/>
+              </a:ext>
+            </a:extLst>
+          </p:cNvPr>
+          <p:cNvSpPr/>
+          <p:nvPr/>
+        </p:nvSpPr>
+        <p:spPr>
+          <a:xfrm>
+            <a:off x="3521906" y="1697122"/>
+            <a:ext cx="1692442" cy="513346"/>
+          </a:xfrm>
+          <a:prstGeom prst="roundRect">
+            <a:avLst/>
+          </a:prstGeom>
+          <a:solidFill>
+            <a:schemeClr val="accent2">
+              <a:lumMod val="40000"/>
+              <a:lumOff val="60000"/>
+            </a:schemeClr>
+          </a:solidFill>
+        </p:spPr>
+        <p:style>
+          <a:lnRef idx="2">
+            <a:schemeClr val="accent1">
+              <a:shade val="50000"/>
+            </a:schemeClr>
+          </a:lnRef>
+          <a:fillRef idx="1">
+            <a:schemeClr val="accent1"/>
+          </a:fillRef>
+          <a:effectRef idx="0">
+            <a:schemeClr val="accent1"/>
+          </a:effectRef>
+          <a:fontRef idx="minor">
+            <a:schemeClr val="lt1"/>
+          </a:fontRef>
+        </p:style>
+        <p:txBody>
+          <a:bodyPr rtlCol="0" anchor="ctr"/>
+          <a:lstStyle/>
+          <a:p>
+            <a:pPr algn="ctr"/>
+            <a:r>
+              <a:rPr lang="en-GB" b="1" dirty="0">
+                <a:solidFill>
+                  <a:schemeClr val="tx2"/>
+                </a:solidFill>
+              </a:rPr>
+              <a:t>Material slot 1</a:t>
+            </a:r>
+          </a:p>
+        </p:txBody>
+      </p:sp>
+      <p:sp>
+        <p:nvSpPr>
+          <p:cNvPr id="19" name="Rectangle: Rounded Corners 18">
+            <a:extLst>
+              <a:ext uri="{FF2B5EF4-FFF2-40B4-BE49-F238E27FC236}">
+                <a16:creationId xmlns:a16="http://schemas.microsoft.com/office/drawing/2014/main" id="{6870E0A3-FFBF-40D6-B99F-6606DF5381FC}"/>
+              </a:ext>
+            </a:extLst>
+          </p:cNvPr>
+          <p:cNvSpPr/>
+          <p:nvPr/>
+        </p:nvSpPr>
+        <p:spPr>
+          <a:xfrm>
+            <a:off x="3521906" y="3399688"/>
+            <a:ext cx="1692442" cy="513346"/>
+          </a:xfrm>
+          <a:prstGeom prst="roundRect">
+            <a:avLst/>
+          </a:prstGeom>
+          <a:solidFill>
+            <a:schemeClr val="accent2">
+              <a:lumMod val="40000"/>
+              <a:lumOff val="60000"/>
+            </a:schemeClr>
+          </a:solidFill>
+        </p:spPr>
+        <p:style>
+          <a:lnRef idx="2">
+            <a:schemeClr val="accent1">
+              <a:shade val="50000"/>
+            </a:schemeClr>
+          </a:lnRef>
+          <a:fillRef idx="1">
+            <a:schemeClr val="accent1"/>
+          </a:fillRef>
+          <a:effectRef idx="0">
+            <a:schemeClr val="accent1"/>
+          </a:effectRef>
+          <a:fontRef idx="minor">
+            <a:schemeClr val="lt1"/>
+          </a:fontRef>
+        </p:style>
+        <p:txBody>
+          <a:bodyPr rtlCol="0" anchor="ctr"/>
+          <a:lstStyle/>
+          <a:p>
+            <a:pPr algn="ctr"/>
+            <a:r>
+              <a:rPr lang="en-GB" b="1" dirty="0">
+                <a:solidFill>
+                  <a:schemeClr val="tx2"/>
+                </a:solidFill>
+              </a:rPr>
+              <a:t>Material slot 2</a:t>
+            </a:r>
+          </a:p>
+        </p:txBody>
+      </p:sp>
+      <p:sp>
+        <p:nvSpPr>
+          <p:cNvPr id="20" name="Rectangle: Rounded Corners 19">
+            <a:extLst>
+              <a:ext uri="{FF2B5EF4-FFF2-40B4-BE49-F238E27FC236}">
+                <a16:creationId xmlns:a16="http://schemas.microsoft.com/office/drawing/2014/main" id="{E8BBC5F2-EC0C-4082-A059-23180EE1C54F}"/>
+              </a:ext>
+            </a:extLst>
+          </p:cNvPr>
+          <p:cNvSpPr/>
+          <p:nvPr/>
+        </p:nvSpPr>
+        <p:spPr>
+          <a:xfrm>
+            <a:off x="3521906" y="5102254"/>
+            <a:ext cx="1692442" cy="513346"/>
+          </a:xfrm>
+          <a:prstGeom prst="roundRect">
+            <a:avLst/>
+          </a:prstGeom>
+          <a:solidFill>
+            <a:schemeClr val="accent2">
+              <a:lumMod val="40000"/>
+              <a:lumOff val="60000"/>
+            </a:schemeClr>
+          </a:solidFill>
+        </p:spPr>
+        <p:style>
+          <a:lnRef idx="2">
+            <a:schemeClr val="accent1">
+              <a:shade val="50000"/>
+            </a:schemeClr>
+          </a:lnRef>
+          <a:fillRef idx="1">
+            <a:schemeClr val="accent1"/>
+          </a:fillRef>
+          <a:effectRef idx="0">
+            <a:schemeClr val="accent1"/>
+          </a:effectRef>
+          <a:fontRef idx="minor">
+            <a:schemeClr val="lt1"/>
+          </a:fontRef>
+        </p:style>
+        <p:txBody>
+          <a:bodyPr rtlCol="0" anchor="ctr"/>
+          <a:lstStyle/>
+          <a:p>
+            <a:pPr algn="ctr"/>
+            <a:r>
+              <a:rPr lang="en-GB" b="1" dirty="0">
+                <a:solidFill>
+                  <a:schemeClr val="tx2"/>
+                </a:solidFill>
+              </a:rPr>
+              <a:t>Material slot 3</a:t>
+            </a:r>
+          </a:p>
+        </p:txBody>
+      </p:sp>
       <p:cxnSp>
         <p:nvCxnSpPr>
-          <p:cNvPr id="3" name="Straight Connector 2">
-            <a:extLst>
-              <a:ext uri="{FF2B5EF4-FFF2-40B4-BE49-F238E27FC236}">
-                <a16:creationId xmlns:a16="http://schemas.microsoft.com/office/drawing/2014/main" id="{DAE4373B-9ABF-4BB6-B211-1CC224013FDC}"/>
+          <p:cNvPr id="31" name="Straight Connector 30">
+            <a:extLst>
+              <a:ext uri="{FF2B5EF4-FFF2-40B4-BE49-F238E27FC236}">
+                <a16:creationId xmlns:a16="http://schemas.microsoft.com/office/drawing/2014/main" id="{F3A2632C-5E21-486D-9B1F-2F4E692A9683}"/>
+              </a:ext>
+            </a:extLst>
+          </p:cNvPr>
+          <p:cNvCxnSpPr>
+            <a:cxnSpLocks/>
+            <a:stCxn id="16" idx="3"/>
+            <a:endCxn id="19" idx="1"/>
+          </p:cNvCxnSpPr>
+          <p:nvPr/>
+        </p:nvCxnSpPr>
+        <p:spPr>
+          <a:xfrm>
+            <a:off x="1692439" y="1953795"/>
+            <a:ext cx="1829467" cy="1702566"/>
+          </a:xfrm>
+          <a:prstGeom prst="line">
+            <a:avLst/>
+          </a:prstGeom>
+          <a:ln/>
+        </p:spPr>
+        <p:style>
+          <a:lnRef idx="1">
+            <a:schemeClr val="accent1"/>
+          </a:lnRef>
+          <a:fillRef idx="0">
+            <a:schemeClr val="accent1"/>
+          </a:fillRef>
+          <a:effectRef idx="0">
+            <a:schemeClr val="accent1"/>
+          </a:effectRef>
+          <a:fontRef idx="minor">
+            <a:schemeClr val="tx1"/>
+          </a:fontRef>
+        </p:style>
+      </p:cxnSp>
+      <p:cxnSp>
+        <p:nvCxnSpPr>
+          <p:cNvPr id="38" name="Straight Connector 37">
+            <a:extLst>
+              <a:ext uri="{FF2B5EF4-FFF2-40B4-BE49-F238E27FC236}">
+                <a16:creationId xmlns:a16="http://schemas.microsoft.com/office/drawing/2014/main" id="{03446A35-4FD5-49D0-B74C-73A03ABDEA19}"/>
+              </a:ext>
+            </a:extLst>
+          </p:cNvPr>
+          <p:cNvCxnSpPr>
+            <a:cxnSpLocks/>
+            <a:stCxn id="17" idx="3"/>
+            <a:endCxn id="20" idx="1"/>
+          </p:cNvCxnSpPr>
+          <p:nvPr/>
+        </p:nvCxnSpPr>
+        <p:spPr>
+          <a:xfrm>
+            <a:off x="1692439" y="2807401"/>
+            <a:ext cx="1829467" cy="2551526"/>
+          </a:xfrm>
+          <a:prstGeom prst="line">
+            <a:avLst/>
+          </a:prstGeom>
+          <a:ln/>
+        </p:spPr>
+        <p:style>
+          <a:lnRef idx="1">
+            <a:schemeClr val="accent1"/>
+          </a:lnRef>
+          <a:fillRef idx="0">
+            <a:schemeClr val="accent1"/>
+          </a:fillRef>
+          <a:effectRef idx="0">
+            <a:schemeClr val="accent1"/>
+          </a:effectRef>
+          <a:fontRef idx="minor">
+            <a:schemeClr val="tx1"/>
+          </a:fontRef>
+        </p:style>
+      </p:cxnSp>
+      <p:cxnSp>
+        <p:nvCxnSpPr>
+          <p:cNvPr id="40" name="Straight Connector 39">
+            <a:extLst>
+              <a:ext uri="{FF2B5EF4-FFF2-40B4-BE49-F238E27FC236}">
+                <a16:creationId xmlns:a16="http://schemas.microsoft.com/office/drawing/2014/main" id="{CAFB3211-0335-4C98-B7C5-F898F192BADE}"/>
+              </a:ext>
+            </a:extLst>
+          </p:cNvPr>
+          <p:cNvCxnSpPr>
+            <a:cxnSpLocks/>
+            <a:endCxn id="20" idx="1"/>
+          </p:cNvCxnSpPr>
+          <p:nvPr/>
+        </p:nvCxnSpPr>
+        <p:spPr>
+          <a:xfrm>
+            <a:off x="1099549" y="5358927"/>
+            <a:ext cx="2422357" cy="0"/>
+          </a:xfrm>
+          <a:prstGeom prst="line">
+            <a:avLst/>
+          </a:prstGeom>
+          <a:ln/>
+        </p:spPr>
+        <p:style>
+          <a:lnRef idx="1">
+            <a:schemeClr val="accent1"/>
+          </a:lnRef>
+          <a:fillRef idx="0">
+            <a:schemeClr val="accent1"/>
+          </a:fillRef>
+          <a:effectRef idx="0">
+            <a:schemeClr val="accent1"/>
+          </a:effectRef>
+          <a:fontRef idx="minor">
+            <a:schemeClr val="tx1"/>
+          </a:fontRef>
+        </p:style>
+      </p:cxnSp>
+      <p:cxnSp>
+        <p:nvCxnSpPr>
+          <p:cNvPr id="43" name="Straight Connector 42">
+            <a:extLst>
+              <a:ext uri="{FF2B5EF4-FFF2-40B4-BE49-F238E27FC236}">
+                <a16:creationId xmlns:a16="http://schemas.microsoft.com/office/drawing/2014/main" id="{1CAA2E84-4824-4703-A567-D6E766FDEB18}"/>
+              </a:ext>
+            </a:extLst>
+          </p:cNvPr>
+          <p:cNvCxnSpPr>
+            <a:cxnSpLocks/>
+            <a:stCxn id="21" idx="3"/>
+            <a:endCxn id="14" idx="1"/>
+          </p:cNvCxnSpPr>
+          <p:nvPr/>
+        </p:nvCxnSpPr>
+        <p:spPr>
+          <a:xfrm flipV="1">
+            <a:off x="1692440" y="1953795"/>
+            <a:ext cx="1829466" cy="2556172"/>
+          </a:xfrm>
+          <a:prstGeom prst="line">
+            <a:avLst/>
+          </a:prstGeom>
+          <a:ln/>
+        </p:spPr>
+        <p:style>
+          <a:lnRef idx="1">
+            <a:schemeClr val="accent1"/>
+          </a:lnRef>
+          <a:fillRef idx="0">
+            <a:schemeClr val="accent1"/>
+          </a:fillRef>
+          <a:effectRef idx="0">
+            <a:schemeClr val="accent1"/>
+          </a:effectRef>
+          <a:fontRef idx="minor">
+            <a:schemeClr val="tx1"/>
+          </a:fontRef>
+        </p:style>
+      </p:cxnSp>
+      <p:cxnSp>
+        <p:nvCxnSpPr>
+          <p:cNvPr id="45" name="Straight Connector 44">
+            <a:extLst>
+              <a:ext uri="{FF2B5EF4-FFF2-40B4-BE49-F238E27FC236}">
+                <a16:creationId xmlns:a16="http://schemas.microsoft.com/office/drawing/2014/main" id="{0992E2A4-1752-457E-882F-9802764B02F5}"/>
+              </a:ext>
+            </a:extLst>
+          </p:cNvPr>
+          <p:cNvCxnSpPr>
+            <a:cxnSpLocks/>
+            <a:endCxn id="19" idx="1"/>
+          </p:cNvCxnSpPr>
+          <p:nvPr/>
+        </p:nvCxnSpPr>
+        <p:spPr>
+          <a:xfrm>
+            <a:off x="1099549" y="3656361"/>
+            <a:ext cx="2422357" cy="0"/>
+          </a:xfrm>
+          <a:prstGeom prst="line">
+            <a:avLst/>
+          </a:prstGeom>
+          <a:ln/>
+        </p:spPr>
+        <p:style>
+          <a:lnRef idx="1">
+            <a:schemeClr val="accent1"/>
+          </a:lnRef>
+          <a:fillRef idx="0">
+            <a:schemeClr val="accent1"/>
+          </a:fillRef>
+          <a:effectRef idx="0">
+            <a:schemeClr val="accent1"/>
+          </a:effectRef>
+          <a:fontRef idx="minor">
+            <a:schemeClr val="tx1"/>
+          </a:fontRef>
+        </p:style>
+      </p:cxnSp>
+      <p:sp>
+        <p:nvSpPr>
+          <p:cNvPr id="54" name="TextBox 53">
+            <a:extLst>
+              <a:ext uri="{FF2B5EF4-FFF2-40B4-BE49-F238E27FC236}">
+                <a16:creationId xmlns:a16="http://schemas.microsoft.com/office/drawing/2014/main" id="{366E36D5-7E2E-406A-AB67-FB8A8580CD76}"/>
+              </a:ext>
+            </a:extLst>
+          </p:cNvPr>
+          <p:cNvSpPr txBox="1"/>
+          <p:nvPr/>
+        </p:nvSpPr>
+        <p:spPr>
+          <a:xfrm>
+            <a:off x="513344" y="950285"/>
+            <a:ext cx="3729793" cy="461665"/>
+          </a:xfrm>
+          <a:prstGeom prst="rect">
+            <a:avLst/>
+          </a:prstGeom>
+          <a:noFill/>
+        </p:spPr>
+        <p:txBody>
+          <a:bodyPr wrap="square" rtlCol="0">
+            <a:spAutoFit/>
+          </a:bodyPr>
+          <a:lstStyle/>
+          <a:p>
+            <a:r>
+              <a:rPr lang="en-GB" sz="2400" dirty="0"/>
+              <a:t>Before merging meshes</a:t>
+            </a:r>
+          </a:p>
+        </p:txBody>
+      </p:sp>
+      <p:sp>
+        <p:nvSpPr>
+          <p:cNvPr id="16" name="Rectangle: Rounded Corners 15">
+            <a:extLst>
+              <a:ext uri="{FF2B5EF4-FFF2-40B4-BE49-F238E27FC236}">
+                <a16:creationId xmlns:a16="http://schemas.microsoft.com/office/drawing/2014/main" id="{0A0BCC7F-9046-4D78-BF74-4394B1B725BF}"/>
+              </a:ext>
+            </a:extLst>
+          </p:cNvPr>
+          <p:cNvSpPr/>
+          <p:nvPr/>
+        </p:nvSpPr>
+        <p:spPr>
+          <a:xfrm>
+            <a:off x="513345" y="1697122"/>
+            <a:ext cx="1179094" cy="513346"/>
+          </a:xfrm>
+          <a:prstGeom prst="roundRect">
+            <a:avLst/>
+          </a:prstGeom>
+          <a:solidFill>
+            <a:schemeClr val="accent1">
+              <a:lumMod val="40000"/>
+              <a:lumOff val="60000"/>
+            </a:schemeClr>
+          </a:solidFill>
+        </p:spPr>
+        <p:style>
+          <a:lnRef idx="2">
+            <a:schemeClr val="accent1">
+              <a:shade val="50000"/>
+            </a:schemeClr>
+          </a:lnRef>
+          <a:fillRef idx="1">
+            <a:schemeClr val="accent1"/>
+          </a:fillRef>
+          <a:effectRef idx="0">
+            <a:schemeClr val="accent1"/>
+          </a:effectRef>
+          <a:fontRef idx="minor">
+            <a:schemeClr val="lt1"/>
+          </a:fontRef>
+        </p:style>
+        <p:txBody>
+          <a:bodyPr rtlCol="0" anchor="ctr"/>
+          <a:lstStyle/>
+          <a:p>
+            <a:pPr algn="ctr"/>
+            <a:r>
+              <a:rPr lang="en-GB" b="1" dirty="0">
+                <a:solidFill>
+                  <a:schemeClr val="tx2"/>
+                </a:solidFill>
+              </a:rPr>
+              <a:t>Mesh 1</a:t>
+            </a:r>
+          </a:p>
+        </p:txBody>
+      </p:sp>
+      <p:sp>
+        <p:nvSpPr>
+          <p:cNvPr id="17" name="Rectangle: Rounded Corners 16">
+            <a:extLst>
+              <a:ext uri="{FF2B5EF4-FFF2-40B4-BE49-F238E27FC236}">
+                <a16:creationId xmlns:a16="http://schemas.microsoft.com/office/drawing/2014/main" id="{7288EDEC-100A-4577-BE2B-51CF0AD1897B}"/>
+              </a:ext>
+            </a:extLst>
+          </p:cNvPr>
+          <p:cNvSpPr/>
+          <p:nvPr/>
+        </p:nvSpPr>
+        <p:spPr>
+          <a:xfrm>
+            <a:off x="513344" y="2550728"/>
+            <a:ext cx="1179095" cy="513346"/>
+          </a:xfrm>
+          <a:prstGeom prst="roundRect">
+            <a:avLst/>
+          </a:prstGeom>
+          <a:solidFill>
+            <a:schemeClr val="accent1">
+              <a:lumMod val="40000"/>
+              <a:lumOff val="60000"/>
+            </a:schemeClr>
+          </a:solidFill>
+        </p:spPr>
+        <p:style>
+          <a:lnRef idx="2">
+            <a:schemeClr val="accent1">
+              <a:shade val="50000"/>
+            </a:schemeClr>
+          </a:lnRef>
+          <a:fillRef idx="1">
+            <a:schemeClr val="accent1"/>
+          </a:fillRef>
+          <a:effectRef idx="0">
+            <a:schemeClr val="accent1"/>
+          </a:effectRef>
+          <a:fontRef idx="minor">
+            <a:schemeClr val="lt1"/>
+          </a:fontRef>
+        </p:style>
+        <p:txBody>
+          <a:bodyPr rtlCol="0" anchor="ctr"/>
+          <a:lstStyle/>
+          <a:p>
+            <a:pPr algn="ctr"/>
+            <a:r>
+              <a:rPr lang="en-GB" b="1" dirty="0">
+                <a:solidFill>
+                  <a:schemeClr val="tx2"/>
+                </a:solidFill>
+              </a:rPr>
+              <a:t>Mesh 2</a:t>
+            </a:r>
+          </a:p>
+        </p:txBody>
+      </p:sp>
+      <p:sp>
+        <p:nvSpPr>
+          <p:cNvPr id="18" name="Rectangle: Rounded Corners 17">
+            <a:extLst>
+              <a:ext uri="{FF2B5EF4-FFF2-40B4-BE49-F238E27FC236}">
+                <a16:creationId xmlns:a16="http://schemas.microsoft.com/office/drawing/2014/main" id="{5331148D-8C18-4600-A130-C65CCBCC665C}"/>
+              </a:ext>
+            </a:extLst>
+          </p:cNvPr>
+          <p:cNvSpPr/>
+          <p:nvPr/>
+        </p:nvSpPr>
+        <p:spPr>
+          <a:xfrm>
+            <a:off x="513344" y="3399688"/>
+            <a:ext cx="1179096" cy="513346"/>
+          </a:xfrm>
+          <a:prstGeom prst="roundRect">
+            <a:avLst/>
+          </a:prstGeom>
+          <a:solidFill>
+            <a:schemeClr val="accent1">
+              <a:lumMod val="40000"/>
+              <a:lumOff val="60000"/>
+            </a:schemeClr>
+          </a:solidFill>
+        </p:spPr>
+        <p:style>
+          <a:lnRef idx="2">
+            <a:schemeClr val="accent1">
+              <a:shade val="50000"/>
+            </a:schemeClr>
+          </a:lnRef>
+          <a:fillRef idx="1">
+            <a:schemeClr val="accent1"/>
+          </a:fillRef>
+          <a:effectRef idx="0">
+            <a:schemeClr val="accent1"/>
+          </a:effectRef>
+          <a:fontRef idx="minor">
+            <a:schemeClr val="lt1"/>
+          </a:fontRef>
+        </p:style>
+        <p:txBody>
+          <a:bodyPr rtlCol="0" anchor="ctr"/>
+          <a:lstStyle/>
+          <a:p>
+            <a:pPr algn="ctr"/>
+            <a:r>
+              <a:rPr lang="en-GB" b="1" dirty="0">
+                <a:solidFill>
+                  <a:schemeClr val="tx2"/>
+                </a:solidFill>
+              </a:rPr>
+              <a:t>Mesh 3</a:t>
+            </a:r>
+          </a:p>
+        </p:txBody>
+      </p:sp>
+      <p:sp>
+        <p:nvSpPr>
+          <p:cNvPr id="21" name="Rectangle: Rounded Corners 20">
+            <a:extLst>
+              <a:ext uri="{FF2B5EF4-FFF2-40B4-BE49-F238E27FC236}">
+                <a16:creationId xmlns:a16="http://schemas.microsoft.com/office/drawing/2014/main" id="{4876A5B8-F678-453D-909F-56F97CA2D2DD}"/>
+              </a:ext>
+            </a:extLst>
+          </p:cNvPr>
+          <p:cNvSpPr/>
+          <p:nvPr/>
+        </p:nvSpPr>
+        <p:spPr>
+          <a:xfrm>
+            <a:off x="513344" y="4253294"/>
+            <a:ext cx="1179096" cy="513346"/>
+          </a:xfrm>
+          <a:prstGeom prst="roundRect">
+            <a:avLst/>
+          </a:prstGeom>
+          <a:solidFill>
+            <a:schemeClr val="accent1">
+              <a:lumMod val="40000"/>
+              <a:lumOff val="60000"/>
+            </a:schemeClr>
+          </a:solidFill>
+        </p:spPr>
+        <p:style>
+          <a:lnRef idx="2">
+            <a:schemeClr val="accent1">
+              <a:shade val="50000"/>
+            </a:schemeClr>
+          </a:lnRef>
+          <a:fillRef idx="1">
+            <a:schemeClr val="accent1"/>
+          </a:fillRef>
+          <a:effectRef idx="0">
+            <a:schemeClr val="accent1"/>
+          </a:effectRef>
+          <a:fontRef idx="minor">
+            <a:schemeClr val="lt1"/>
+          </a:fontRef>
+        </p:style>
+        <p:txBody>
+          <a:bodyPr rtlCol="0" anchor="ctr"/>
+          <a:lstStyle/>
+          <a:p>
+            <a:pPr algn="ctr"/>
+            <a:r>
+              <a:rPr lang="en-GB" b="1" dirty="0">
+                <a:solidFill>
+                  <a:schemeClr val="tx2"/>
+                </a:solidFill>
+              </a:rPr>
+              <a:t>Mesh 4</a:t>
+            </a:r>
+          </a:p>
+        </p:txBody>
+      </p:sp>
+      <p:sp>
+        <p:nvSpPr>
+          <p:cNvPr id="22" name="Rectangle: Rounded Corners 21">
+            <a:extLst>
+              <a:ext uri="{FF2B5EF4-FFF2-40B4-BE49-F238E27FC236}">
+                <a16:creationId xmlns:a16="http://schemas.microsoft.com/office/drawing/2014/main" id="{8A149570-1BFB-4C5B-BC0C-4E382AE65F8B}"/>
+              </a:ext>
+            </a:extLst>
+          </p:cNvPr>
+          <p:cNvSpPr/>
+          <p:nvPr/>
+        </p:nvSpPr>
+        <p:spPr>
+          <a:xfrm>
+            <a:off x="513344" y="5102254"/>
+            <a:ext cx="1179096" cy="513346"/>
+          </a:xfrm>
+          <a:prstGeom prst="roundRect">
+            <a:avLst/>
+          </a:prstGeom>
+          <a:solidFill>
+            <a:schemeClr val="accent1">
+              <a:lumMod val="40000"/>
+              <a:lumOff val="60000"/>
+            </a:schemeClr>
+          </a:solidFill>
+        </p:spPr>
+        <p:style>
+          <a:lnRef idx="2">
+            <a:schemeClr val="accent1">
+              <a:shade val="50000"/>
+            </a:schemeClr>
+          </a:lnRef>
+          <a:fillRef idx="1">
+            <a:schemeClr val="accent1"/>
+          </a:fillRef>
+          <a:effectRef idx="0">
+            <a:schemeClr val="accent1"/>
+          </a:effectRef>
+          <a:fontRef idx="minor">
+            <a:schemeClr val="lt1"/>
+          </a:fontRef>
+        </p:style>
+        <p:txBody>
+          <a:bodyPr rtlCol="0" anchor="ctr"/>
+          <a:lstStyle/>
+          <a:p>
+            <a:pPr algn="ctr"/>
+            <a:r>
+              <a:rPr lang="en-GB" b="1" dirty="0">
+                <a:solidFill>
+                  <a:schemeClr val="tx2"/>
+                </a:solidFill>
+              </a:rPr>
+              <a:t>Mesh 5</a:t>
+            </a:r>
+          </a:p>
+        </p:txBody>
+      </p:sp>
+      <p:sp>
+        <p:nvSpPr>
+          <p:cNvPr id="23" name="Rectangle: Rounded Corners 22">
+            <a:extLst>
+              <a:ext uri="{FF2B5EF4-FFF2-40B4-BE49-F238E27FC236}">
+                <a16:creationId xmlns:a16="http://schemas.microsoft.com/office/drawing/2014/main" id="{89A27619-2F7D-434A-8FE5-1FB245797D03}"/>
+              </a:ext>
+            </a:extLst>
+          </p:cNvPr>
+          <p:cNvSpPr/>
+          <p:nvPr/>
+        </p:nvSpPr>
+        <p:spPr>
+          <a:xfrm>
+            <a:off x="6312569" y="4033384"/>
+            <a:ext cx="1283366" cy="770019"/>
+          </a:xfrm>
+          <a:prstGeom prst="roundRect">
+            <a:avLst/>
+          </a:prstGeom>
+          <a:solidFill>
+            <a:schemeClr val="accent1">
+              <a:lumMod val="40000"/>
+              <a:lumOff val="60000"/>
+            </a:schemeClr>
+          </a:solidFill>
+        </p:spPr>
+        <p:style>
+          <a:lnRef idx="2">
+            <a:schemeClr val="accent1">
+              <a:shade val="50000"/>
+            </a:schemeClr>
+          </a:lnRef>
+          <a:fillRef idx="1">
+            <a:schemeClr val="accent1"/>
+          </a:fillRef>
+          <a:effectRef idx="0">
+            <a:schemeClr val="accent1"/>
+          </a:effectRef>
+          <a:fontRef idx="minor">
+            <a:schemeClr val="lt1"/>
+          </a:fontRef>
+        </p:style>
+        <p:txBody>
+          <a:bodyPr rtlCol="0" anchor="ctr"/>
+          <a:lstStyle/>
+          <a:p>
+            <a:pPr algn="ctr"/>
+            <a:r>
+              <a:rPr lang="en-GB" b="1" dirty="0">
+                <a:solidFill>
+                  <a:schemeClr val="tx2"/>
+                </a:solidFill>
+              </a:rPr>
+              <a:t>Mesh 3 (merged)</a:t>
+            </a:r>
+          </a:p>
+        </p:txBody>
+      </p:sp>
+      <p:sp>
+        <p:nvSpPr>
+          <p:cNvPr id="24" name="Rectangle: Rounded Corners 23">
+            <a:extLst>
+              <a:ext uri="{FF2B5EF4-FFF2-40B4-BE49-F238E27FC236}">
+                <a16:creationId xmlns:a16="http://schemas.microsoft.com/office/drawing/2014/main" id="{9E31684F-3623-4430-B29C-E0EB9B92B861}"/>
+              </a:ext>
+            </a:extLst>
+          </p:cNvPr>
+          <p:cNvSpPr/>
+          <p:nvPr/>
+        </p:nvSpPr>
+        <p:spPr>
+          <a:xfrm>
+            <a:off x="10018288" y="1773121"/>
+            <a:ext cx="1692442" cy="513346"/>
+          </a:xfrm>
+          <a:prstGeom prst="roundRect">
+            <a:avLst/>
+          </a:prstGeom>
+          <a:solidFill>
+            <a:schemeClr val="accent2">
+              <a:lumMod val="40000"/>
+              <a:lumOff val="60000"/>
+            </a:schemeClr>
+          </a:solidFill>
+        </p:spPr>
+        <p:style>
+          <a:lnRef idx="2">
+            <a:schemeClr val="accent1">
+              <a:shade val="50000"/>
+            </a:schemeClr>
+          </a:lnRef>
+          <a:fillRef idx="1">
+            <a:schemeClr val="accent1"/>
+          </a:fillRef>
+          <a:effectRef idx="0">
+            <a:schemeClr val="accent1"/>
+          </a:effectRef>
+          <a:fontRef idx="minor">
+            <a:schemeClr val="lt1"/>
+          </a:fontRef>
+        </p:style>
+        <p:txBody>
+          <a:bodyPr rtlCol="0" anchor="ctr"/>
+          <a:lstStyle/>
+          <a:p>
+            <a:pPr algn="ctr"/>
+            <a:r>
+              <a:rPr lang="en-GB" b="1" dirty="0">
+                <a:solidFill>
+                  <a:schemeClr val="tx2"/>
+                </a:solidFill>
+              </a:rPr>
+              <a:t>Material slot 1</a:t>
+            </a:r>
+          </a:p>
+        </p:txBody>
+      </p:sp>
+      <p:sp>
+        <p:nvSpPr>
+          <p:cNvPr id="25" name="Rectangle: Rounded Corners 24">
+            <a:extLst>
+              <a:ext uri="{FF2B5EF4-FFF2-40B4-BE49-F238E27FC236}">
+                <a16:creationId xmlns:a16="http://schemas.microsoft.com/office/drawing/2014/main" id="{52CC0421-560E-4D8B-8550-CE7C45826BA5}"/>
+              </a:ext>
+            </a:extLst>
+          </p:cNvPr>
+          <p:cNvSpPr/>
+          <p:nvPr/>
+        </p:nvSpPr>
+        <p:spPr>
+          <a:xfrm>
+            <a:off x="10042362" y="2984427"/>
+            <a:ext cx="1692442" cy="513346"/>
+          </a:xfrm>
+          <a:prstGeom prst="roundRect">
+            <a:avLst/>
+          </a:prstGeom>
+          <a:solidFill>
+            <a:schemeClr val="accent2">
+              <a:lumMod val="40000"/>
+              <a:lumOff val="60000"/>
+            </a:schemeClr>
+          </a:solidFill>
+        </p:spPr>
+        <p:style>
+          <a:lnRef idx="2">
+            <a:schemeClr val="accent1">
+              <a:shade val="50000"/>
+            </a:schemeClr>
+          </a:lnRef>
+          <a:fillRef idx="1">
+            <a:schemeClr val="accent1"/>
+          </a:fillRef>
+          <a:effectRef idx="0">
+            <a:schemeClr val="accent1"/>
+          </a:effectRef>
+          <a:fontRef idx="minor">
+            <a:schemeClr val="lt1"/>
+          </a:fontRef>
+        </p:style>
+        <p:txBody>
+          <a:bodyPr rtlCol="0" anchor="ctr"/>
+          <a:lstStyle/>
+          <a:p>
+            <a:pPr algn="ctr"/>
+            <a:r>
+              <a:rPr lang="en-GB" b="1" dirty="0">
+                <a:solidFill>
+                  <a:schemeClr val="tx2"/>
+                </a:solidFill>
+              </a:rPr>
+              <a:t>Material slot 2</a:t>
+            </a:r>
+          </a:p>
+        </p:txBody>
+      </p:sp>
+      <p:sp>
+        <p:nvSpPr>
+          <p:cNvPr id="26" name="Rectangle: Rounded Corners 25">
+            <a:extLst>
+              <a:ext uri="{FF2B5EF4-FFF2-40B4-BE49-F238E27FC236}">
+                <a16:creationId xmlns:a16="http://schemas.microsoft.com/office/drawing/2014/main" id="{8CC57E35-FBB1-4E68-BFDE-8F710F93E43C}"/>
+              </a:ext>
+            </a:extLst>
+          </p:cNvPr>
+          <p:cNvSpPr/>
+          <p:nvPr/>
+        </p:nvSpPr>
+        <p:spPr>
+          <a:xfrm>
+            <a:off x="10018288" y="4156208"/>
+            <a:ext cx="1692442" cy="513346"/>
+          </a:xfrm>
+          <a:prstGeom prst="roundRect">
+            <a:avLst/>
+          </a:prstGeom>
+          <a:solidFill>
+            <a:schemeClr val="accent2">
+              <a:lumMod val="40000"/>
+              <a:lumOff val="60000"/>
+            </a:schemeClr>
+          </a:solidFill>
+        </p:spPr>
+        <p:style>
+          <a:lnRef idx="2">
+            <a:schemeClr val="accent1">
+              <a:shade val="50000"/>
+            </a:schemeClr>
+          </a:lnRef>
+          <a:fillRef idx="1">
+            <a:schemeClr val="accent1"/>
+          </a:fillRef>
+          <a:effectRef idx="0">
+            <a:schemeClr val="accent1"/>
+          </a:effectRef>
+          <a:fontRef idx="minor">
+            <a:schemeClr val="lt1"/>
+          </a:fontRef>
+        </p:style>
+        <p:txBody>
+          <a:bodyPr rtlCol="0" anchor="ctr"/>
+          <a:lstStyle/>
+          <a:p>
+            <a:pPr algn="ctr"/>
+            <a:r>
+              <a:rPr lang="en-GB" b="1" dirty="0">
+                <a:solidFill>
+                  <a:schemeClr val="tx2"/>
+                </a:solidFill>
+              </a:rPr>
+              <a:t>Material slot 3</a:t>
+            </a:r>
+          </a:p>
+        </p:txBody>
+      </p:sp>
+      <p:cxnSp>
+        <p:nvCxnSpPr>
+          <p:cNvPr id="27" name="Straight Connector 26">
+            <a:extLst>
+              <a:ext uri="{FF2B5EF4-FFF2-40B4-BE49-F238E27FC236}">
+                <a16:creationId xmlns:a16="http://schemas.microsoft.com/office/drawing/2014/main" id="{4643C030-3212-433B-8E6B-823C554F9905}"/>
+              </a:ext>
+            </a:extLst>
+          </p:cNvPr>
+          <p:cNvCxnSpPr>
+            <a:cxnSpLocks/>
+            <a:stCxn id="23" idx="3"/>
+            <a:endCxn id="24" idx="1"/>
+          </p:cNvCxnSpPr>
+          <p:nvPr/>
+        </p:nvCxnSpPr>
+        <p:spPr>
+          <a:xfrm flipV="1">
+            <a:off x="7595935" y="2029794"/>
+            <a:ext cx="2422353" cy="2388600"/>
+          </a:xfrm>
+          <a:prstGeom prst="line">
+            <a:avLst/>
+          </a:prstGeom>
+          <a:ln/>
+        </p:spPr>
+        <p:style>
+          <a:lnRef idx="1">
+            <a:schemeClr val="accent1"/>
+          </a:lnRef>
+          <a:fillRef idx="0">
+            <a:schemeClr val="accent1"/>
+          </a:fillRef>
+          <a:effectRef idx="0">
+            <a:schemeClr val="accent1"/>
+          </a:effectRef>
+          <a:fontRef idx="minor">
+            <a:schemeClr val="tx1"/>
+          </a:fontRef>
+        </p:style>
+      </p:cxnSp>
+      <p:sp>
+        <p:nvSpPr>
+          <p:cNvPr id="28" name="Rectangle: Rounded Corners 27">
+            <a:extLst>
+              <a:ext uri="{FF2B5EF4-FFF2-40B4-BE49-F238E27FC236}">
+                <a16:creationId xmlns:a16="http://schemas.microsoft.com/office/drawing/2014/main" id="{51E51CD0-07D4-4FC8-BF3D-15225B62B84C}"/>
+              </a:ext>
+            </a:extLst>
+          </p:cNvPr>
+          <p:cNvSpPr/>
+          <p:nvPr/>
+        </p:nvSpPr>
+        <p:spPr>
+          <a:xfrm>
+            <a:off x="6312569" y="1650298"/>
+            <a:ext cx="1283366" cy="770019"/>
+          </a:xfrm>
+          <a:prstGeom prst="roundRect">
+            <a:avLst/>
+          </a:prstGeom>
+          <a:solidFill>
+            <a:schemeClr val="accent1">
+              <a:lumMod val="40000"/>
+              <a:lumOff val="60000"/>
+            </a:schemeClr>
+          </a:solidFill>
+        </p:spPr>
+        <p:style>
+          <a:lnRef idx="2">
+            <a:schemeClr val="accent1">
+              <a:shade val="50000"/>
+            </a:schemeClr>
+          </a:lnRef>
+          <a:fillRef idx="1">
+            <a:schemeClr val="accent1"/>
+          </a:fillRef>
+          <a:effectRef idx="0">
+            <a:schemeClr val="accent1"/>
+          </a:effectRef>
+          <a:fontRef idx="minor">
+            <a:schemeClr val="lt1"/>
+          </a:fontRef>
+        </p:style>
+        <p:txBody>
+          <a:bodyPr rtlCol="0" anchor="ctr"/>
+          <a:lstStyle/>
+          <a:p>
+            <a:pPr algn="ctr"/>
+            <a:r>
+              <a:rPr lang="en-GB" b="1" dirty="0">
+                <a:solidFill>
+                  <a:schemeClr val="tx2"/>
+                </a:solidFill>
+              </a:rPr>
+              <a:t>Mesh 1 (merged)</a:t>
+            </a:r>
+          </a:p>
+        </p:txBody>
+      </p:sp>
+      <p:sp>
+        <p:nvSpPr>
+          <p:cNvPr id="29" name="Rectangle: Rounded Corners 28">
+            <a:extLst>
+              <a:ext uri="{FF2B5EF4-FFF2-40B4-BE49-F238E27FC236}">
+                <a16:creationId xmlns:a16="http://schemas.microsoft.com/office/drawing/2014/main" id="{EFDC1369-6C90-4964-88F4-E212E6949217}"/>
+              </a:ext>
+            </a:extLst>
+          </p:cNvPr>
+          <p:cNvSpPr/>
+          <p:nvPr/>
+        </p:nvSpPr>
+        <p:spPr>
+          <a:xfrm>
+            <a:off x="6312569" y="2861783"/>
+            <a:ext cx="1283364" cy="770019"/>
+          </a:xfrm>
+          <a:prstGeom prst="roundRect">
+            <a:avLst/>
+          </a:prstGeom>
+          <a:solidFill>
+            <a:schemeClr val="accent1">
+              <a:lumMod val="40000"/>
+              <a:lumOff val="60000"/>
+            </a:schemeClr>
+          </a:solidFill>
+        </p:spPr>
+        <p:style>
+          <a:lnRef idx="2">
+            <a:schemeClr val="accent1">
+              <a:shade val="50000"/>
+            </a:schemeClr>
+          </a:lnRef>
+          <a:fillRef idx="1">
+            <a:schemeClr val="accent1"/>
+          </a:fillRef>
+          <a:effectRef idx="0">
+            <a:schemeClr val="accent1"/>
+          </a:effectRef>
+          <a:fontRef idx="minor">
+            <a:schemeClr val="lt1"/>
+          </a:fontRef>
+        </p:style>
+        <p:txBody>
+          <a:bodyPr rtlCol="0" anchor="ctr"/>
+          <a:lstStyle/>
+          <a:p>
+            <a:pPr algn="ctr"/>
+            <a:r>
+              <a:rPr lang="en-GB" b="1" dirty="0">
+                <a:solidFill>
+                  <a:schemeClr val="tx2"/>
+                </a:solidFill>
+              </a:rPr>
+              <a:t>Mesh 2 (merged)</a:t>
+            </a:r>
+          </a:p>
+        </p:txBody>
+      </p:sp>
+      <p:cxnSp>
+        <p:nvCxnSpPr>
+          <p:cNvPr id="30" name="Straight Connector 29">
+            <a:extLst>
+              <a:ext uri="{FF2B5EF4-FFF2-40B4-BE49-F238E27FC236}">
+                <a16:creationId xmlns:a16="http://schemas.microsoft.com/office/drawing/2014/main" id="{D4F33B80-C97A-45B9-9F93-891E3EE17256}"/>
+              </a:ext>
+            </a:extLst>
+          </p:cNvPr>
+          <p:cNvCxnSpPr>
+            <a:cxnSpLocks/>
+            <a:stCxn id="28" idx="3"/>
+            <a:endCxn id="25" idx="1"/>
+          </p:cNvCxnSpPr>
+          <p:nvPr/>
+        </p:nvCxnSpPr>
+        <p:spPr>
+          <a:xfrm>
+            <a:off x="7595935" y="2035308"/>
+            <a:ext cx="2446427" cy="1205792"/>
+          </a:xfrm>
+          <a:prstGeom prst="line">
+            <a:avLst/>
+          </a:prstGeom>
+          <a:ln/>
+        </p:spPr>
+        <p:style>
+          <a:lnRef idx="1">
+            <a:schemeClr val="accent1"/>
+          </a:lnRef>
+          <a:fillRef idx="0">
+            <a:schemeClr val="accent1"/>
+          </a:fillRef>
+          <a:effectRef idx="0">
+            <a:schemeClr val="accent1"/>
+          </a:effectRef>
+          <a:fontRef idx="minor">
+            <a:schemeClr val="tx1"/>
+          </a:fontRef>
+        </p:style>
+      </p:cxnSp>
+      <p:cxnSp>
+        <p:nvCxnSpPr>
+          <p:cNvPr id="32" name="Straight Connector 31">
+            <a:extLst>
+              <a:ext uri="{FF2B5EF4-FFF2-40B4-BE49-F238E27FC236}">
+                <a16:creationId xmlns:a16="http://schemas.microsoft.com/office/drawing/2014/main" id="{AE244D51-6E9A-476F-BD78-2D96D70CFFA2}"/>
+              </a:ext>
+            </a:extLst>
+          </p:cNvPr>
+          <p:cNvCxnSpPr>
+            <a:cxnSpLocks/>
+            <a:stCxn id="29" idx="3"/>
+          </p:cNvCxnSpPr>
+          <p:nvPr/>
+        </p:nvCxnSpPr>
+        <p:spPr>
+          <a:xfrm>
+            <a:off x="7595933" y="3246793"/>
+            <a:ext cx="2422355" cy="1160574"/>
+          </a:xfrm>
+          <a:prstGeom prst="line">
+            <a:avLst/>
+          </a:prstGeom>
+          <a:ln/>
+        </p:spPr>
+        <p:style>
+          <a:lnRef idx="1">
+            <a:schemeClr val="accent1"/>
+          </a:lnRef>
+          <a:fillRef idx="0">
+            <a:schemeClr val="accent1"/>
+          </a:fillRef>
+          <a:effectRef idx="0">
+            <a:schemeClr val="accent1"/>
+          </a:effectRef>
+          <a:fontRef idx="minor">
+            <a:schemeClr val="tx1"/>
+          </a:fontRef>
+        </p:style>
+      </p:cxnSp>
+      <p:cxnSp>
+        <p:nvCxnSpPr>
+          <p:cNvPr id="35" name="Straight Connector 34">
+            <a:extLst>
+              <a:ext uri="{FF2B5EF4-FFF2-40B4-BE49-F238E27FC236}">
+                <a16:creationId xmlns:a16="http://schemas.microsoft.com/office/drawing/2014/main" id="{88E903BC-BAA0-4C71-A71D-CD6BF2588D2F}"/>
               </a:ext>
             </a:extLst>
           </p:cNvPr>
@@ -4574,7 +5672,7 @@
         </p:nvCxnSpPr>
         <p:spPr>
           <a:xfrm>
-            <a:off x="6319252" y="1044529"/>
+            <a:off x="5701631" y="950285"/>
             <a:ext cx="0" cy="5156200"/>
           </a:xfrm>
           <a:prstGeom prst="line">
@@ -4607,1021 +5705,10 @@
       </p:cxnSp>
       <p:sp>
         <p:nvSpPr>
-          <p:cNvPr id="9" name="Rectangle: Rounded Corners 8">
-            <a:extLst>
-              <a:ext uri="{FF2B5EF4-FFF2-40B4-BE49-F238E27FC236}">
-                <a16:creationId xmlns:a16="http://schemas.microsoft.com/office/drawing/2014/main" id="{7FD159BF-D1EE-4C7E-B8BB-0CCD1F7EA0DE}"/>
-              </a:ext>
-            </a:extLst>
-          </p:cNvPr>
-          <p:cNvSpPr/>
-          <p:nvPr/>
-        </p:nvSpPr>
-        <p:spPr>
-          <a:xfrm>
-            <a:off x="1331494" y="1673059"/>
-            <a:ext cx="1692442" cy="513346"/>
-          </a:xfrm>
-          <a:prstGeom prst="roundRect">
-            <a:avLst/>
-          </a:prstGeom>
-          <a:solidFill>
-            <a:schemeClr val="accent1">
-              <a:lumMod val="40000"/>
-              <a:lumOff val="60000"/>
-            </a:schemeClr>
-          </a:solidFill>
-        </p:spPr>
-        <p:style>
-          <a:lnRef idx="2">
-            <a:schemeClr val="accent1">
-              <a:shade val="50000"/>
-            </a:schemeClr>
-          </a:lnRef>
-          <a:fillRef idx="1">
-            <a:schemeClr val="accent1"/>
-          </a:fillRef>
-          <a:effectRef idx="0">
-            <a:schemeClr val="accent1"/>
-          </a:effectRef>
-          <a:fontRef idx="minor">
-            <a:schemeClr val="lt1"/>
-          </a:fontRef>
-        </p:style>
-        <p:txBody>
-          <a:bodyPr rtlCol="0" anchor="ctr"/>
-          <a:lstStyle/>
-          <a:p>
-            <a:pPr algn="ctr"/>
-            <a:r>
-              <a:rPr lang="en-GB" b="1" dirty="0" err="1">
-                <a:solidFill>
-                  <a:schemeClr val="tx2"/>
-                </a:solidFill>
-              </a:rPr>
-              <a:t>Submesh</a:t>
-            </a:r>
-            <a:r>
-              <a:rPr lang="en-GB" b="1" dirty="0">
-                <a:solidFill>
-                  <a:schemeClr val="tx2"/>
-                </a:solidFill>
-              </a:rPr>
-              <a:t> 1</a:t>
-            </a:r>
-          </a:p>
-        </p:txBody>
-      </p:sp>
-      <p:sp>
-        <p:nvSpPr>
-          <p:cNvPr id="10" name="Rectangle: Rounded Corners 9">
-            <a:extLst>
-              <a:ext uri="{FF2B5EF4-FFF2-40B4-BE49-F238E27FC236}">
-                <a16:creationId xmlns:a16="http://schemas.microsoft.com/office/drawing/2014/main" id="{9187CA4D-00A4-4612-BD2B-9A919D34A9A9}"/>
-              </a:ext>
-            </a:extLst>
-          </p:cNvPr>
-          <p:cNvSpPr/>
-          <p:nvPr/>
-        </p:nvSpPr>
-        <p:spPr>
-          <a:xfrm>
-            <a:off x="1331495" y="2526665"/>
-            <a:ext cx="1692442" cy="513346"/>
-          </a:xfrm>
-          <a:prstGeom prst="roundRect">
-            <a:avLst/>
-          </a:prstGeom>
-          <a:solidFill>
-            <a:schemeClr val="accent1">
-              <a:lumMod val="40000"/>
-              <a:lumOff val="60000"/>
-            </a:schemeClr>
-          </a:solidFill>
-        </p:spPr>
-        <p:style>
-          <a:lnRef idx="2">
-            <a:schemeClr val="accent1">
-              <a:shade val="50000"/>
-            </a:schemeClr>
-          </a:lnRef>
-          <a:fillRef idx="1">
-            <a:schemeClr val="accent1"/>
-          </a:fillRef>
-          <a:effectRef idx="0">
-            <a:schemeClr val="accent1"/>
-          </a:effectRef>
-          <a:fontRef idx="minor">
-            <a:schemeClr val="lt1"/>
-          </a:fontRef>
-        </p:style>
-        <p:txBody>
-          <a:bodyPr rtlCol="0" anchor="ctr"/>
-          <a:lstStyle/>
-          <a:p>
-            <a:pPr algn="ctr"/>
-            <a:r>
-              <a:rPr lang="en-GB" b="1" dirty="0" err="1">
-                <a:solidFill>
-                  <a:schemeClr val="tx2"/>
-                </a:solidFill>
-              </a:rPr>
-              <a:t>Submesh</a:t>
-            </a:r>
-            <a:r>
-              <a:rPr lang="en-GB" b="1" dirty="0">
-                <a:solidFill>
-                  <a:schemeClr val="tx2"/>
-                </a:solidFill>
-              </a:rPr>
-              <a:t> 2</a:t>
-            </a:r>
-          </a:p>
-        </p:txBody>
-      </p:sp>
-      <p:sp>
-        <p:nvSpPr>
-          <p:cNvPr id="11" name="Rectangle: Rounded Corners 10">
-            <a:extLst>
-              <a:ext uri="{FF2B5EF4-FFF2-40B4-BE49-F238E27FC236}">
-                <a16:creationId xmlns:a16="http://schemas.microsoft.com/office/drawing/2014/main" id="{B2D108C5-E802-447B-8880-2C31A6EB1E2A}"/>
-              </a:ext>
-            </a:extLst>
-          </p:cNvPr>
-          <p:cNvSpPr/>
-          <p:nvPr/>
-        </p:nvSpPr>
-        <p:spPr>
-          <a:xfrm>
-            <a:off x="1331494" y="3375625"/>
-            <a:ext cx="1692443" cy="513346"/>
-          </a:xfrm>
-          <a:prstGeom prst="roundRect">
-            <a:avLst/>
-          </a:prstGeom>
-          <a:solidFill>
-            <a:schemeClr val="accent1">
-              <a:lumMod val="40000"/>
-              <a:lumOff val="60000"/>
-            </a:schemeClr>
-          </a:solidFill>
-        </p:spPr>
-        <p:style>
-          <a:lnRef idx="2">
-            <a:schemeClr val="accent1">
-              <a:shade val="50000"/>
-            </a:schemeClr>
-          </a:lnRef>
-          <a:fillRef idx="1">
-            <a:schemeClr val="accent1"/>
-          </a:fillRef>
-          <a:effectRef idx="0">
-            <a:schemeClr val="accent1"/>
-          </a:effectRef>
-          <a:fontRef idx="minor">
-            <a:schemeClr val="lt1"/>
-          </a:fontRef>
-        </p:style>
-        <p:txBody>
-          <a:bodyPr rtlCol="0" anchor="ctr"/>
-          <a:lstStyle/>
-          <a:p>
-            <a:pPr algn="ctr"/>
-            <a:r>
-              <a:rPr lang="en-GB" b="1" dirty="0" err="1">
-                <a:solidFill>
-                  <a:schemeClr val="tx2"/>
-                </a:solidFill>
-              </a:rPr>
-              <a:t>Submesh</a:t>
-            </a:r>
-            <a:r>
-              <a:rPr lang="en-GB" b="1" dirty="0">
-                <a:solidFill>
-                  <a:schemeClr val="tx2"/>
-                </a:solidFill>
-              </a:rPr>
-              <a:t> 3</a:t>
-            </a:r>
-          </a:p>
-        </p:txBody>
-      </p:sp>
-      <p:sp>
-        <p:nvSpPr>
-          <p:cNvPr id="12" name="Rectangle: Rounded Corners 11">
-            <a:extLst>
-              <a:ext uri="{FF2B5EF4-FFF2-40B4-BE49-F238E27FC236}">
-                <a16:creationId xmlns:a16="http://schemas.microsoft.com/office/drawing/2014/main" id="{952C3D0D-6F3C-456B-8E53-E86F89829CF1}"/>
-              </a:ext>
-            </a:extLst>
-          </p:cNvPr>
-          <p:cNvSpPr/>
-          <p:nvPr/>
-        </p:nvSpPr>
-        <p:spPr>
-          <a:xfrm>
-            <a:off x="1331495" y="4229231"/>
-            <a:ext cx="1692442" cy="513346"/>
-          </a:xfrm>
-          <a:prstGeom prst="roundRect">
-            <a:avLst/>
-          </a:prstGeom>
-          <a:solidFill>
-            <a:schemeClr val="accent1">
-              <a:lumMod val="40000"/>
-              <a:lumOff val="60000"/>
-            </a:schemeClr>
-          </a:solidFill>
-        </p:spPr>
-        <p:style>
-          <a:lnRef idx="2">
-            <a:schemeClr val="accent1">
-              <a:shade val="50000"/>
-            </a:schemeClr>
-          </a:lnRef>
-          <a:fillRef idx="1">
-            <a:schemeClr val="accent1"/>
-          </a:fillRef>
-          <a:effectRef idx="0">
-            <a:schemeClr val="accent1"/>
-          </a:effectRef>
-          <a:fontRef idx="minor">
-            <a:schemeClr val="lt1"/>
-          </a:fontRef>
-        </p:style>
-        <p:txBody>
-          <a:bodyPr rtlCol="0" anchor="ctr"/>
-          <a:lstStyle/>
-          <a:p>
-            <a:pPr algn="ctr"/>
-            <a:r>
-              <a:rPr lang="en-GB" b="1" dirty="0" err="1">
-                <a:solidFill>
-                  <a:schemeClr val="tx2"/>
-                </a:solidFill>
-              </a:rPr>
-              <a:t>Submesh</a:t>
-            </a:r>
-            <a:r>
-              <a:rPr lang="en-GB" b="1" dirty="0">
-                <a:solidFill>
-                  <a:schemeClr val="tx2"/>
-                </a:solidFill>
-              </a:rPr>
-              <a:t> 4</a:t>
-            </a:r>
-          </a:p>
-        </p:txBody>
-      </p:sp>
-      <p:sp>
-        <p:nvSpPr>
-          <p:cNvPr id="13" name="Rectangle: Rounded Corners 12">
-            <a:extLst>
-              <a:ext uri="{FF2B5EF4-FFF2-40B4-BE49-F238E27FC236}">
-                <a16:creationId xmlns:a16="http://schemas.microsoft.com/office/drawing/2014/main" id="{CB734BFF-E232-47B0-A923-4DB40124C325}"/>
-              </a:ext>
-            </a:extLst>
-          </p:cNvPr>
-          <p:cNvSpPr/>
-          <p:nvPr/>
-        </p:nvSpPr>
-        <p:spPr>
-          <a:xfrm>
-            <a:off x="1331495" y="5078191"/>
-            <a:ext cx="1692442" cy="513346"/>
-          </a:xfrm>
-          <a:prstGeom prst="roundRect">
-            <a:avLst/>
-          </a:prstGeom>
-          <a:solidFill>
-            <a:schemeClr val="accent1">
-              <a:lumMod val="40000"/>
-              <a:lumOff val="60000"/>
-            </a:schemeClr>
-          </a:solidFill>
-        </p:spPr>
-        <p:style>
-          <a:lnRef idx="2">
-            <a:schemeClr val="accent1">
-              <a:shade val="50000"/>
-            </a:schemeClr>
-          </a:lnRef>
-          <a:fillRef idx="1">
-            <a:schemeClr val="accent1"/>
-          </a:fillRef>
-          <a:effectRef idx="0">
-            <a:schemeClr val="accent1"/>
-          </a:effectRef>
-          <a:fontRef idx="minor">
-            <a:schemeClr val="lt1"/>
-          </a:fontRef>
-        </p:style>
-        <p:txBody>
-          <a:bodyPr rtlCol="0" anchor="ctr"/>
-          <a:lstStyle/>
-          <a:p>
-            <a:pPr algn="ctr"/>
-            <a:r>
-              <a:rPr lang="en-GB" b="1" dirty="0" err="1">
-                <a:solidFill>
-                  <a:schemeClr val="tx2"/>
-                </a:solidFill>
-              </a:rPr>
-              <a:t>Submesh</a:t>
-            </a:r>
-            <a:r>
-              <a:rPr lang="en-GB" b="1" dirty="0">
-                <a:solidFill>
-                  <a:schemeClr val="tx2"/>
-                </a:solidFill>
-              </a:rPr>
-              <a:t> 5</a:t>
-            </a:r>
-          </a:p>
-        </p:txBody>
-      </p:sp>
-      <p:sp>
-        <p:nvSpPr>
-          <p:cNvPr id="14" name="Rectangle: Rounded Corners 13">
-            <a:extLst>
-              <a:ext uri="{FF2B5EF4-FFF2-40B4-BE49-F238E27FC236}">
-                <a16:creationId xmlns:a16="http://schemas.microsoft.com/office/drawing/2014/main" id="{CDF70A4A-AD09-4F68-9E76-59CFFBD99214}"/>
-              </a:ext>
-            </a:extLst>
-          </p:cNvPr>
-          <p:cNvSpPr/>
-          <p:nvPr/>
-        </p:nvSpPr>
-        <p:spPr>
-          <a:xfrm>
-            <a:off x="5446294" y="1673059"/>
-            <a:ext cx="1692442" cy="513346"/>
-          </a:xfrm>
-          <a:prstGeom prst="roundRect">
-            <a:avLst/>
-          </a:prstGeom>
-          <a:solidFill>
-            <a:schemeClr val="accent2">
-              <a:lumMod val="40000"/>
-              <a:lumOff val="60000"/>
-            </a:schemeClr>
-          </a:solidFill>
-        </p:spPr>
-        <p:style>
-          <a:lnRef idx="2">
-            <a:schemeClr val="accent1">
-              <a:shade val="50000"/>
-            </a:schemeClr>
-          </a:lnRef>
-          <a:fillRef idx="1">
-            <a:schemeClr val="accent1"/>
-          </a:fillRef>
-          <a:effectRef idx="0">
-            <a:schemeClr val="accent1"/>
-          </a:effectRef>
-          <a:fontRef idx="minor">
-            <a:schemeClr val="lt1"/>
-          </a:fontRef>
-        </p:style>
-        <p:txBody>
-          <a:bodyPr rtlCol="0" anchor="ctr"/>
-          <a:lstStyle/>
-          <a:p>
-            <a:pPr algn="ctr"/>
-            <a:r>
-              <a:rPr lang="en-GB" b="1" dirty="0">
-                <a:solidFill>
-                  <a:schemeClr val="tx2"/>
-                </a:solidFill>
-              </a:rPr>
-              <a:t>Material slot 1</a:t>
-            </a:r>
-          </a:p>
-        </p:txBody>
-      </p:sp>
-      <p:sp>
-        <p:nvSpPr>
-          <p:cNvPr id="19" name="Rectangle: Rounded Corners 18">
-            <a:extLst>
-              <a:ext uri="{FF2B5EF4-FFF2-40B4-BE49-F238E27FC236}">
-                <a16:creationId xmlns:a16="http://schemas.microsoft.com/office/drawing/2014/main" id="{6870E0A3-FFBF-40D6-B99F-6606DF5381FC}"/>
-              </a:ext>
-            </a:extLst>
-          </p:cNvPr>
-          <p:cNvSpPr/>
-          <p:nvPr/>
-        </p:nvSpPr>
-        <p:spPr>
-          <a:xfrm>
-            <a:off x="5446294" y="3375625"/>
-            <a:ext cx="1692442" cy="513346"/>
-          </a:xfrm>
-          <a:prstGeom prst="roundRect">
-            <a:avLst/>
-          </a:prstGeom>
-          <a:solidFill>
-            <a:schemeClr val="accent2">
-              <a:lumMod val="40000"/>
-              <a:lumOff val="60000"/>
-            </a:schemeClr>
-          </a:solidFill>
-        </p:spPr>
-        <p:style>
-          <a:lnRef idx="2">
-            <a:schemeClr val="accent1">
-              <a:shade val="50000"/>
-            </a:schemeClr>
-          </a:lnRef>
-          <a:fillRef idx="1">
-            <a:schemeClr val="accent1"/>
-          </a:fillRef>
-          <a:effectRef idx="0">
-            <a:schemeClr val="accent1"/>
-          </a:effectRef>
-          <a:fontRef idx="minor">
-            <a:schemeClr val="lt1"/>
-          </a:fontRef>
-        </p:style>
-        <p:txBody>
-          <a:bodyPr rtlCol="0" anchor="ctr"/>
-          <a:lstStyle/>
-          <a:p>
-            <a:pPr algn="ctr"/>
-            <a:r>
-              <a:rPr lang="en-GB" b="1" dirty="0">
-                <a:solidFill>
-                  <a:schemeClr val="tx2"/>
-                </a:solidFill>
-              </a:rPr>
-              <a:t>Material slot 2</a:t>
-            </a:r>
-          </a:p>
-        </p:txBody>
-      </p:sp>
-      <p:sp>
-        <p:nvSpPr>
-          <p:cNvPr id="20" name="Rectangle: Rounded Corners 19">
-            <a:extLst>
-              <a:ext uri="{FF2B5EF4-FFF2-40B4-BE49-F238E27FC236}">
-                <a16:creationId xmlns:a16="http://schemas.microsoft.com/office/drawing/2014/main" id="{E8BBC5F2-EC0C-4082-A059-23180EE1C54F}"/>
-              </a:ext>
-            </a:extLst>
-          </p:cNvPr>
-          <p:cNvSpPr/>
-          <p:nvPr/>
-        </p:nvSpPr>
-        <p:spPr>
-          <a:xfrm>
-            <a:off x="5446294" y="5078191"/>
-            <a:ext cx="1692442" cy="513346"/>
-          </a:xfrm>
-          <a:prstGeom prst="roundRect">
-            <a:avLst/>
-          </a:prstGeom>
-          <a:solidFill>
-            <a:schemeClr val="accent2">
-              <a:lumMod val="40000"/>
-              <a:lumOff val="60000"/>
-            </a:schemeClr>
-          </a:solidFill>
-        </p:spPr>
-        <p:style>
-          <a:lnRef idx="2">
-            <a:schemeClr val="accent1">
-              <a:shade val="50000"/>
-            </a:schemeClr>
-          </a:lnRef>
-          <a:fillRef idx="1">
-            <a:schemeClr val="accent1"/>
-          </a:fillRef>
-          <a:effectRef idx="0">
-            <a:schemeClr val="accent1"/>
-          </a:effectRef>
-          <a:fontRef idx="minor">
-            <a:schemeClr val="lt1"/>
-          </a:fontRef>
-        </p:style>
-        <p:txBody>
-          <a:bodyPr rtlCol="0" anchor="ctr"/>
-          <a:lstStyle/>
-          <a:p>
-            <a:pPr algn="ctr"/>
-            <a:r>
-              <a:rPr lang="en-GB" b="1" dirty="0">
-                <a:solidFill>
-                  <a:schemeClr val="tx2"/>
-                </a:solidFill>
-              </a:rPr>
-              <a:t>Material slot 3</a:t>
-            </a:r>
-          </a:p>
-        </p:txBody>
-      </p:sp>
-      <p:sp>
-        <p:nvSpPr>
-          <p:cNvPr id="21" name="Rectangle: Rounded Corners 20">
-            <a:extLst>
-              <a:ext uri="{FF2B5EF4-FFF2-40B4-BE49-F238E27FC236}">
-                <a16:creationId xmlns:a16="http://schemas.microsoft.com/office/drawing/2014/main" id="{4F2B8CC4-4339-4F8C-8194-9ADCBD0B8FD9}"/>
-              </a:ext>
-            </a:extLst>
-          </p:cNvPr>
-          <p:cNvSpPr/>
-          <p:nvPr/>
-        </p:nvSpPr>
-        <p:spPr>
-          <a:xfrm>
-            <a:off x="8485607" y="1673059"/>
-            <a:ext cx="1548062" cy="513346"/>
-          </a:xfrm>
-          <a:prstGeom prst="roundRect">
-            <a:avLst/>
-          </a:prstGeom>
-          <a:solidFill>
-            <a:schemeClr val="accent6">
-              <a:lumMod val="20000"/>
-              <a:lumOff val="80000"/>
-            </a:schemeClr>
-          </a:solidFill>
-        </p:spPr>
-        <p:style>
-          <a:lnRef idx="2">
-            <a:schemeClr val="accent1">
-              <a:shade val="50000"/>
-            </a:schemeClr>
-          </a:lnRef>
-          <a:fillRef idx="1">
-            <a:schemeClr val="accent1"/>
-          </a:fillRef>
-          <a:effectRef idx="0">
-            <a:schemeClr val="accent1"/>
-          </a:effectRef>
-          <a:fontRef idx="minor">
-            <a:schemeClr val="lt1"/>
-          </a:fontRef>
-        </p:style>
-        <p:txBody>
-          <a:bodyPr rtlCol="0" anchor="ctr"/>
-          <a:lstStyle/>
-          <a:p>
-            <a:pPr algn="ctr"/>
-            <a:r>
-              <a:rPr lang="en-GB" b="1" dirty="0">
-                <a:solidFill>
-                  <a:schemeClr val="tx2"/>
-                </a:solidFill>
-              </a:rPr>
-              <a:t>MyMaterial1</a:t>
-            </a:r>
-          </a:p>
-        </p:txBody>
-      </p:sp>
-      <p:sp>
-        <p:nvSpPr>
-          <p:cNvPr id="26" name="Rectangle: Rounded Corners 25">
-            <a:extLst>
-              <a:ext uri="{FF2B5EF4-FFF2-40B4-BE49-F238E27FC236}">
-                <a16:creationId xmlns:a16="http://schemas.microsoft.com/office/drawing/2014/main" id="{1317E929-0DE2-4DDB-9B0F-5E490219231A}"/>
-              </a:ext>
-            </a:extLst>
-          </p:cNvPr>
-          <p:cNvSpPr/>
-          <p:nvPr/>
-        </p:nvSpPr>
-        <p:spPr>
-          <a:xfrm>
-            <a:off x="8485607" y="3375625"/>
-            <a:ext cx="1548062" cy="513346"/>
-          </a:xfrm>
-          <a:prstGeom prst="roundRect">
-            <a:avLst/>
-          </a:prstGeom>
-          <a:solidFill>
-            <a:schemeClr val="accent6">
-              <a:lumMod val="20000"/>
-              <a:lumOff val="80000"/>
-            </a:schemeClr>
-          </a:solidFill>
-        </p:spPr>
-        <p:style>
-          <a:lnRef idx="2">
-            <a:schemeClr val="accent1">
-              <a:shade val="50000"/>
-            </a:schemeClr>
-          </a:lnRef>
-          <a:fillRef idx="1">
-            <a:schemeClr val="accent1"/>
-          </a:fillRef>
-          <a:effectRef idx="0">
-            <a:schemeClr val="accent1"/>
-          </a:effectRef>
-          <a:fontRef idx="minor">
-            <a:schemeClr val="lt1"/>
-          </a:fontRef>
-        </p:style>
-        <p:txBody>
-          <a:bodyPr rtlCol="0" anchor="ctr"/>
-          <a:lstStyle/>
-          <a:p>
-            <a:pPr algn="ctr"/>
-            <a:r>
-              <a:rPr lang="en-GB" b="1" dirty="0">
-                <a:solidFill>
-                  <a:schemeClr val="tx2"/>
-                </a:solidFill>
-              </a:rPr>
-              <a:t>MyMaterial2</a:t>
-            </a:r>
-          </a:p>
-        </p:txBody>
-      </p:sp>
-      <p:sp>
-        <p:nvSpPr>
-          <p:cNvPr id="27" name="Rectangle: Rounded Corners 26">
-            <a:extLst>
-              <a:ext uri="{FF2B5EF4-FFF2-40B4-BE49-F238E27FC236}">
-                <a16:creationId xmlns:a16="http://schemas.microsoft.com/office/drawing/2014/main" id="{C336E104-75CC-4C99-815E-0644D582672A}"/>
-              </a:ext>
-            </a:extLst>
-          </p:cNvPr>
-          <p:cNvSpPr/>
-          <p:nvPr/>
-        </p:nvSpPr>
-        <p:spPr>
-          <a:xfrm>
-            <a:off x="8485607" y="5078191"/>
-            <a:ext cx="1548062" cy="513346"/>
-          </a:xfrm>
-          <a:prstGeom prst="roundRect">
-            <a:avLst/>
-          </a:prstGeom>
-          <a:solidFill>
-            <a:schemeClr val="accent6">
-              <a:lumMod val="20000"/>
-              <a:lumOff val="80000"/>
-            </a:schemeClr>
-          </a:solidFill>
-        </p:spPr>
-        <p:style>
-          <a:lnRef idx="2">
-            <a:schemeClr val="accent1">
-              <a:shade val="50000"/>
-            </a:schemeClr>
-          </a:lnRef>
-          <a:fillRef idx="1">
-            <a:schemeClr val="accent1"/>
-          </a:fillRef>
-          <a:effectRef idx="0">
-            <a:schemeClr val="accent1"/>
-          </a:effectRef>
-          <a:fontRef idx="minor">
-            <a:schemeClr val="lt1"/>
-          </a:fontRef>
-        </p:style>
-        <p:txBody>
-          <a:bodyPr rtlCol="0" anchor="ctr"/>
-          <a:lstStyle/>
-          <a:p>
-            <a:pPr algn="ctr"/>
-            <a:r>
-              <a:rPr lang="en-GB" b="1" dirty="0">
-                <a:solidFill>
-                  <a:schemeClr val="tx2"/>
-                </a:solidFill>
-              </a:rPr>
-              <a:t>MyMaterial3</a:t>
-            </a:r>
-          </a:p>
-        </p:txBody>
-      </p:sp>
-      <p:cxnSp>
-        <p:nvCxnSpPr>
-          <p:cNvPr id="31" name="Straight Connector 30">
-            <a:extLst>
-              <a:ext uri="{FF2B5EF4-FFF2-40B4-BE49-F238E27FC236}">
-                <a16:creationId xmlns:a16="http://schemas.microsoft.com/office/drawing/2014/main" id="{F3A2632C-5E21-486D-9B1F-2F4E692A9683}"/>
-              </a:ext>
-            </a:extLst>
-          </p:cNvPr>
-          <p:cNvCxnSpPr>
-            <a:cxnSpLocks/>
-            <a:stCxn id="9" idx="3"/>
-            <a:endCxn id="19" idx="1"/>
-          </p:cNvCxnSpPr>
-          <p:nvPr/>
-        </p:nvCxnSpPr>
-        <p:spPr>
-          <a:xfrm>
-            <a:off x="3023936" y="1929732"/>
-            <a:ext cx="2422358" cy="1702566"/>
-          </a:xfrm>
-          <a:prstGeom prst="line">
-            <a:avLst/>
-          </a:prstGeom>
-          <a:ln/>
-        </p:spPr>
-        <p:style>
-          <a:lnRef idx="1">
-            <a:schemeClr val="accent1"/>
-          </a:lnRef>
-          <a:fillRef idx="0">
-            <a:schemeClr val="accent1"/>
-          </a:fillRef>
-          <a:effectRef idx="0">
-            <a:schemeClr val="accent1"/>
-          </a:effectRef>
-          <a:fontRef idx="minor">
-            <a:schemeClr val="tx1"/>
-          </a:fontRef>
-        </p:style>
-      </p:cxnSp>
-      <p:cxnSp>
-        <p:nvCxnSpPr>
-          <p:cNvPr id="38" name="Straight Connector 37">
-            <a:extLst>
-              <a:ext uri="{FF2B5EF4-FFF2-40B4-BE49-F238E27FC236}">
-                <a16:creationId xmlns:a16="http://schemas.microsoft.com/office/drawing/2014/main" id="{03446A35-4FD5-49D0-B74C-73A03ABDEA19}"/>
-              </a:ext>
-            </a:extLst>
-          </p:cNvPr>
-          <p:cNvCxnSpPr>
-            <a:cxnSpLocks/>
-            <a:stCxn id="10" idx="3"/>
-            <a:endCxn id="20" idx="1"/>
-          </p:cNvCxnSpPr>
-          <p:nvPr/>
-        </p:nvCxnSpPr>
-        <p:spPr>
-          <a:xfrm>
-            <a:off x="3023937" y="2783338"/>
-            <a:ext cx="2422357" cy="2551526"/>
-          </a:xfrm>
-          <a:prstGeom prst="line">
-            <a:avLst/>
-          </a:prstGeom>
-          <a:ln/>
-        </p:spPr>
-        <p:style>
-          <a:lnRef idx="1">
-            <a:schemeClr val="accent1"/>
-          </a:lnRef>
-          <a:fillRef idx="0">
-            <a:schemeClr val="accent1"/>
-          </a:fillRef>
-          <a:effectRef idx="0">
-            <a:schemeClr val="accent1"/>
-          </a:effectRef>
-          <a:fontRef idx="minor">
-            <a:schemeClr val="tx1"/>
-          </a:fontRef>
-        </p:style>
-      </p:cxnSp>
-      <p:cxnSp>
-        <p:nvCxnSpPr>
-          <p:cNvPr id="40" name="Straight Connector 39">
-            <a:extLst>
-              <a:ext uri="{FF2B5EF4-FFF2-40B4-BE49-F238E27FC236}">
-                <a16:creationId xmlns:a16="http://schemas.microsoft.com/office/drawing/2014/main" id="{CAFB3211-0335-4C98-B7C5-F898F192BADE}"/>
-              </a:ext>
-            </a:extLst>
-          </p:cNvPr>
-          <p:cNvCxnSpPr>
-            <a:cxnSpLocks/>
-            <a:stCxn id="13" idx="3"/>
-            <a:endCxn id="20" idx="1"/>
-          </p:cNvCxnSpPr>
-          <p:nvPr/>
-        </p:nvCxnSpPr>
-        <p:spPr>
-          <a:xfrm>
-            <a:off x="3023937" y="5334864"/>
-            <a:ext cx="2422357" cy="0"/>
-          </a:xfrm>
-          <a:prstGeom prst="line">
-            <a:avLst/>
-          </a:prstGeom>
-          <a:ln/>
-        </p:spPr>
-        <p:style>
-          <a:lnRef idx="1">
-            <a:schemeClr val="accent1"/>
-          </a:lnRef>
-          <a:fillRef idx="0">
-            <a:schemeClr val="accent1"/>
-          </a:fillRef>
-          <a:effectRef idx="0">
-            <a:schemeClr val="accent1"/>
-          </a:effectRef>
-          <a:fontRef idx="minor">
-            <a:schemeClr val="tx1"/>
-          </a:fontRef>
-        </p:style>
-      </p:cxnSp>
-      <p:cxnSp>
-        <p:nvCxnSpPr>
-          <p:cNvPr id="43" name="Straight Connector 42">
-            <a:extLst>
-              <a:ext uri="{FF2B5EF4-FFF2-40B4-BE49-F238E27FC236}">
-                <a16:creationId xmlns:a16="http://schemas.microsoft.com/office/drawing/2014/main" id="{1CAA2E84-4824-4703-A567-D6E766FDEB18}"/>
-              </a:ext>
-            </a:extLst>
-          </p:cNvPr>
-          <p:cNvCxnSpPr>
-            <a:cxnSpLocks/>
-            <a:endCxn id="14" idx="1"/>
-          </p:cNvCxnSpPr>
-          <p:nvPr/>
-        </p:nvCxnSpPr>
-        <p:spPr>
-          <a:xfrm flipV="1">
-            <a:off x="3023936" y="1929732"/>
-            <a:ext cx="2422358" cy="2501084"/>
-          </a:xfrm>
-          <a:prstGeom prst="line">
-            <a:avLst/>
-          </a:prstGeom>
-          <a:ln/>
-        </p:spPr>
-        <p:style>
-          <a:lnRef idx="1">
-            <a:schemeClr val="accent1"/>
-          </a:lnRef>
-          <a:fillRef idx="0">
-            <a:schemeClr val="accent1"/>
-          </a:fillRef>
-          <a:effectRef idx="0">
-            <a:schemeClr val="accent1"/>
-          </a:effectRef>
-          <a:fontRef idx="minor">
-            <a:schemeClr val="tx1"/>
-          </a:fontRef>
-        </p:style>
-      </p:cxnSp>
-      <p:cxnSp>
-        <p:nvCxnSpPr>
-          <p:cNvPr id="45" name="Straight Connector 44">
-            <a:extLst>
-              <a:ext uri="{FF2B5EF4-FFF2-40B4-BE49-F238E27FC236}">
-                <a16:creationId xmlns:a16="http://schemas.microsoft.com/office/drawing/2014/main" id="{0992E2A4-1752-457E-882F-9802764B02F5}"/>
-              </a:ext>
-            </a:extLst>
-          </p:cNvPr>
-          <p:cNvCxnSpPr>
-            <a:cxnSpLocks/>
-            <a:stCxn id="11" idx="3"/>
-            <a:endCxn id="19" idx="1"/>
-          </p:cNvCxnSpPr>
-          <p:nvPr/>
-        </p:nvCxnSpPr>
-        <p:spPr>
-          <a:xfrm>
-            <a:off x="3023937" y="3632298"/>
-            <a:ext cx="2422357" cy="0"/>
-          </a:xfrm>
-          <a:prstGeom prst="line">
-            <a:avLst/>
-          </a:prstGeom>
-          <a:ln/>
-        </p:spPr>
-        <p:style>
-          <a:lnRef idx="1">
-            <a:schemeClr val="accent1"/>
-          </a:lnRef>
-          <a:fillRef idx="0">
-            <a:schemeClr val="accent1"/>
-          </a:fillRef>
-          <a:effectRef idx="0">
-            <a:schemeClr val="accent1"/>
-          </a:effectRef>
-          <a:fontRef idx="minor">
-            <a:schemeClr val="tx1"/>
-          </a:fontRef>
-        </p:style>
-      </p:cxnSp>
-      <p:cxnSp>
-        <p:nvCxnSpPr>
-          <p:cNvPr id="48" name="Straight Connector 47">
-            <a:extLst>
-              <a:ext uri="{FF2B5EF4-FFF2-40B4-BE49-F238E27FC236}">
-                <a16:creationId xmlns:a16="http://schemas.microsoft.com/office/drawing/2014/main" id="{AFFB78DF-1760-41F8-9170-B5B23E11F8EA}"/>
-              </a:ext>
-            </a:extLst>
-          </p:cNvPr>
-          <p:cNvCxnSpPr>
-            <a:cxnSpLocks/>
-            <a:stCxn id="14" idx="3"/>
-            <a:endCxn id="21" idx="1"/>
-          </p:cNvCxnSpPr>
-          <p:nvPr/>
-        </p:nvCxnSpPr>
-        <p:spPr>
-          <a:xfrm>
-            <a:off x="7138736" y="1929732"/>
-            <a:ext cx="1346871" cy="0"/>
-          </a:xfrm>
-          <a:prstGeom prst="line">
-            <a:avLst/>
-          </a:prstGeom>
-        </p:spPr>
-        <p:style>
-          <a:lnRef idx="1">
-            <a:schemeClr val="accent1"/>
-          </a:lnRef>
-          <a:fillRef idx="0">
-            <a:schemeClr val="accent1"/>
-          </a:fillRef>
-          <a:effectRef idx="0">
-            <a:schemeClr val="accent1"/>
-          </a:effectRef>
-          <a:fontRef idx="minor">
-            <a:schemeClr val="tx1"/>
-          </a:fontRef>
-        </p:style>
-      </p:cxnSp>
-      <p:cxnSp>
-        <p:nvCxnSpPr>
-          <p:cNvPr id="51" name="Straight Connector 50">
-            <a:extLst>
-              <a:ext uri="{FF2B5EF4-FFF2-40B4-BE49-F238E27FC236}">
-                <a16:creationId xmlns:a16="http://schemas.microsoft.com/office/drawing/2014/main" id="{E69B7730-EAEA-48B8-A805-53771D6589AF}"/>
-              </a:ext>
-            </a:extLst>
-          </p:cNvPr>
-          <p:cNvCxnSpPr>
-            <a:stCxn id="19" idx="3"/>
-            <a:endCxn id="26" idx="1"/>
-          </p:cNvCxnSpPr>
-          <p:nvPr/>
-        </p:nvCxnSpPr>
-        <p:spPr>
-          <a:xfrm>
-            <a:off x="7138736" y="3632298"/>
-            <a:ext cx="1346871" cy="0"/>
-          </a:xfrm>
-          <a:prstGeom prst="line">
-            <a:avLst/>
-          </a:prstGeom>
-        </p:spPr>
-        <p:style>
-          <a:lnRef idx="1">
-            <a:schemeClr val="accent1"/>
-          </a:lnRef>
-          <a:fillRef idx="0">
-            <a:schemeClr val="accent1"/>
-          </a:fillRef>
-          <a:effectRef idx="0">
-            <a:schemeClr val="accent1"/>
-          </a:effectRef>
-          <a:fontRef idx="minor">
-            <a:schemeClr val="tx1"/>
-          </a:fontRef>
-        </p:style>
-      </p:cxnSp>
-      <p:cxnSp>
-        <p:nvCxnSpPr>
-          <p:cNvPr id="53" name="Straight Connector 52">
-            <a:extLst>
-              <a:ext uri="{FF2B5EF4-FFF2-40B4-BE49-F238E27FC236}">
-                <a16:creationId xmlns:a16="http://schemas.microsoft.com/office/drawing/2014/main" id="{3395D4B6-3DB4-4C9D-8EB2-7F5720EDAF7B}"/>
-              </a:ext>
-            </a:extLst>
-          </p:cNvPr>
-          <p:cNvCxnSpPr>
-            <a:stCxn id="20" idx="3"/>
-            <a:endCxn id="27" idx="1"/>
-          </p:cNvCxnSpPr>
-          <p:nvPr/>
-        </p:nvCxnSpPr>
-        <p:spPr>
-          <a:xfrm>
-            <a:off x="7138736" y="5334864"/>
-            <a:ext cx="1346871" cy="0"/>
-          </a:xfrm>
-          <a:prstGeom prst="line">
-            <a:avLst/>
-          </a:prstGeom>
-        </p:spPr>
-        <p:style>
-          <a:lnRef idx="1">
-            <a:schemeClr val="accent1"/>
-          </a:lnRef>
-          <a:fillRef idx="0">
-            <a:schemeClr val="accent1"/>
-          </a:fillRef>
-          <a:effectRef idx="0">
-            <a:schemeClr val="accent1"/>
-          </a:effectRef>
-          <a:fontRef idx="minor">
-            <a:schemeClr val="tx1"/>
-          </a:fontRef>
-        </p:style>
-      </p:cxnSp>
-      <p:sp>
-        <p:nvSpPr>
-          <p:cNvPr id="54" name="TextBox 53">
-            <a:extLst>
-              <a:ext uri="{FF2B5EF4-FFF2-40B4-BE49-F238E27FC236}">
-                <a16:creationId xmlns:a16="http://schemas.microsoft.com/office/drawing/2014/main" id="{366E36D5-7E2E-406A-AB67-FB8A8580CD76}"/>
+          <p:cNvPr id="36" name="TextBox 35">
+            <a:extLst>
+              <a:ext uri="{FF2B5EF4-FFF2-40B4-BE49-F238E27FC236}">
+                <a16:creationId xmlns:a16="http://schemas.microsoft.com/office/drawing/2014/main" id="{18702B27-CA2F-49DB-A86D-CE2AC9EA7C57}"/>
               </a:ext>
             </a:extLst>
           </p:cNvPr>
@@ -5630,8 +5717,8 @@
         </p:nvSpPr>
         <p:spPr>
           <a:xfrm>
-            <a:off x="1331494" y="893166"/>
-            <a:ext cx="5226384" cy="461665"/>
+            <a:off x="6312569" y="900507"/>
+            <a:ext cx="3729793" cy="461665"/>
           </a:xfrm>
           <a:prstGeom prst="rect">
             <a:avLst/>
@@ -5646,829 +5733,8 @@
           <a:p>
             <a:r>
               <a:rPr lang="en-GB" sz="2400" dirty="0"/>
-              <a:t>Model definition (in source file)</a:t>
-            </a:r>
-          </a:p>
-        </p:txBody>
-      </p:sp>
-      <p:sp>
-        <p:nvSpPr>
-          <p:cNvPr id="55" name="TextBox 54">
-            <a:extLst>
-              <a:ext uri="{FF2B5EF4-FFF2-40B4-BE49-F238E27FC236}">
-                <a16:creationId xmlns:a16="http://schemas.microsoft.com/office/drawing/2014/main" id="{A0E7E293-AA22-45E9-A37D-60A36FCB3AF1}"/>
-              </a:ext>
-            </a:extLst>
-          </p:cNvPr>
-          <p:cNvSpPr txBox="1"/>
-          <p:nvPr/>
-        </p:nvSpPr>
-        <p:spPr>
-          <a:xfrm>
-            <a:off x="8485607" y="893166"/>
-            <a:ext cx="3987800" cy="461665"/>
-          </a:xfrm>
-          <a:prstGeom prst="rect">
-            <a:avLst/>
-          </a:prstGeom>
-          <a:noFill/>
-        </p:spPr>
-        <p:txBody>
-          <a:bodyPr wrap="square" rtlCol="0">
-            <a:spAutoFit/>
-          </a:bodyPr>
-          <a:lstStyle/>
-          <a:p>
-            <a:r>
-              <a:rPr lang="en-GB" sz="2400" dirty="0"/>
-              <a:t>Game Studio</a:t>
-            </a:r>
-          </a:p>
-        </p:txBody>
-      </p:sp>
-    </p:spTree>
-    <p:extLst>
-      <p:ext uri="{BB962C8B-B14F-4D97-AF65-F5344CB8AC3E}">
-        <p14:creationId xmlns:p14="http://schemas.microsoft.com/office/powerpoint/2010/main" val="4223368684"/>
-      </p:ext>
-    </p:extLst>
-  </p:cSld>
-  <p:clrMapOvr>
-    <a:masterClrMapping/>
-  </p:clrMapOvr>
-</p:sld>
-</file>
-
-<file path=ppt/slides/slide3.xml><?xml version="1.0" encoding="utf-8"?>
-<p:sld xmlns:a="http://schemas.openxmlformats.org/drawingml/2006/main" xmlns:r="http://schemas.openxmlformats.org/officeDocument/2006/relationships" xmlns:p="http://schemas.openxmlformats.org/presentationml/2006/main">
-  <p:cSld>
-    <p:spTree>
-      <p:nvGrpSpPr>
-        <p:cNvPr id="1" name=""/>
-        <p:cNvGrpSpPr/>
-        <p:nvPr/>
-      </p:nvGrpSpPr>
-      <p:grpSpPr>
-        <a:xfrm>
-          <a:off x="0" y="0"/>
-          <a:ext cx="0" cy="0"/>
-          <a:chOff x="0" y="0"/>
-          <a:chExt cx="0" cy="0"/>
-        </a:xfrm>
-      </p:grpSpPr>
-      <p:sp>
-        <p:nvSpPr>
-          <p:cNvPr id="9" name="Rectangle: Rounded Corners 8">
-            <a:extLst>
-              <a:ext uri="{FF2B5EF4-FFF2-40B4-BE49-F238E27FC236}">
-                <a16:creationId xmlns:a16="http://schemas.microsoft.com/office/drawing/2014/main" id="{7FD159BF-D1EE-4C7E-B8BB-0CCD1F7EA0DE}"/>
-              </a:ext>
-            </a:extLst>
-          </p:cNvPr>
-          <p:cNvSpPr/>
-          <p:nvPr/>
-        </p:nvSpPr>
-        <p:spPr>
-          <a:xfrm>
-            <a:off x="1331494" y="1673059"/>
-            <a:ext cx="1692442" cy="513346"/>
-          </a:xfrm>
-          <a:prstGeom prst="roundRect">
-            <a:avLst/>
-          </a:prstGeom>
-          <a:solidFill>
-            <a:schemeClr val="accent1">
-              <a:lumMod val="40000"/>
-              <a:lumOff val="60000"/>
-            </a:schemeClr>
-          </a:solidFill>
-        </p:spPr>
-        <p:style>
-          <a:lnRef idx="2">
-            <a:schemeClr val="accent1">
-              <a:shade val="50000"/>
-            </a:schemeClr>
-          </a:lnRef>
-          <a:fillRef idx="1">
-            <a:schemeClr val="accent1"/>
-          </a:fillRef>
-          <a:effectRef idx="0">
-            <a:schemeClr val="accent1"/>
-          </a:effectRef>
-          <a:fontRef idx="minor">
-            <a:schemeClr val="lt1"/>
-          </a:fontRef>
-        </p:style>
-        <p:txBody>
-          <a:bodyPr rtlCol="0" anchor="ctr"/>
-          <a:lstStyle/>
-          <a:p>
-            <a:pPr algn="ctr"/>
-            <a:r>
-              <a:rPr lang="en-GB" b="1" dirty="0" err="1">
-                <a:solidFill>
-                  <a:schemeClr val="tx2"/>
-                </a:solidFill>
-              </a:rPr>
-              <a:t>Submesh</a:t>
-            </a:r>
-            <a:r>
-              <a:rPr lang="en-GB" b="1" dirty="0">
-                <a:solidFill>
-                  <a:schemeClr val="tx2"/>
-                </a:solidFill>
-              </a:rPr>
-              <a:t> 1</a:t>
-            </a:r>
-          </a:p>
-        </p:txBody>
-      </p:sp>
-      <p:sp>
-        <p:nvSpPr>
-          <p:cNvPr id="10" name="Rectangle: Rounded Corners 9">
-            <a:extLst>
-              <a:ext uri="{FF2B5EF4-FFF2-40B4-BE49-F238E27FC236}">
-                <a16:creationId xmlns:a16="http://schemas.microsoft.com/office/drawing/2014/main" id="{9187CA4D-00A4-4612-BD2B-9A919D34A9A9}"/>
-              </a:ext>
-            </a:extLst>
-          </p:cNvPr>
-          <p:cNvSpPr/>
-          <p:nvPr/>
-        </p:nvSpPr>
-        <p:spPr>
-          <a:xfrm>
-            <a:off x="1331495" y="2526665"/>
-            <a:ext cx="1692442" cy="513346"/>
-          </a:xfrm>
-          <a:prstGeom prst="roundRect">
-            <a:avLst/>
-          </a:prstGeom>
-          <a:solidFill>
-            <a:schemeClr val="accent1">
-              <a:lumMod val="40000"/>
-              <a:lumOff val="60000"/>
-            </a:schemeClr>
-          </a:solidFill>
-        </p:spPr>
-        <p:style>
-          <a:lnRef idx="2">
-            <a:schemeClr val="accent1">
-              <a:shade val="50000"/>
-            </a:schemeClr>
-          </a:lnRef>
-          <a:fillRef idx="1">
-            <a:schemeClr val="accent1"/>
-          </a:fillRef>
-          <a:effectRef idx="0">
-            <a:schemeClr val="accent1"/>
-          </a:effectRef>
-          <a:fontRef idx="minor">
-            <a:schemeClr val="lt1"/>
-          </a:fontRef>
-        </p:style>
-        <p:txBody>
-          <a:bodyPr rtlCol="0" anchor="ctr"/>
-          <a:lstStyle/>
-          <a:p>
-            <a:pPr algn="ctr"/>
-            <a:r>
-              <a:rPr lang="en-GB" b="1" dirty="0" err="1">
-                <a:solidFill>
-                  <a:schemeClr val="tx2"/>
-                </a:solidFill>
-              </a:rPr>
-              <a:t>Submesh</a:t>
-            </a:r>
-            <a:r>
-              <a:rPr lang="en-GB" b="1" dirty="0">
-                <a:solidFill>
-                  <a:schemeClr val="tx2"/>
-                </a:solidFill>
-              </a:rPr>
-              <a:t> 2</a:t>
-            </a:r>
-          </a:p>
-        </p:txBody>
-      </p:sp>
-      <p:sp>
-        <p:nvSpPr>
-          <p:cNvPr id="11" name="Rectangle: Rounded Corners 10">
-            <a:extLst>
-              <a:ext uri="{FF2B5EF4-FFF2-40B4-BE49-F238E27FC236}">
-                <a16:creationId xmlns:a16="http://schemas.microsoft.com/office/drawing/2014/main" id="{B2D108C5-E802-447B-8880-2C31A6EB1E2A}"/>
-              </a:ext>
-            </a:extLst>
-          </p:cNvPr>
-          <p:cNvSpPr/>
-          <p:nvPr/>
-        </p:nvSpPr>
-        <p:spPr>
-          <a:xfrm>
-            <a:off x="1331494" y="3375625"/>
-            <a:ext cx="1692443" cy="513346"/>
-          </a:xfrm>
-          <a:prstGeom prst="roundRect">
-            <a:avLst/>
-          </a:prstGeom>
-          <a:solidFill>
-            <a:schemeClr val="accent1">
-              <a:lumMod val="40000"/>
-              <a:lumOff val="60000"/>
-            </a:schemeClr>
-          </a:solidFill>
-        </p:spPr>
-        <p:style>
-          <a:lnRef idx="2">
-            <a:schemeClr val="accent1">
-              <a:shade val="50000"/>
-            </a:schemeClr>
-          </a:lnRef>
-          <a:fillRef idx="1">
-            <a:schemeClr val="accent1"/>
-          </a:fillRef>
-          <a:effectRef idx="0">
-            <a:schemeClr val="accent1"/>
-          </a:effectRef>
-          <a:fontRef idx="minor">
-            <a:schemeClr val="lt1"/>
-          </a:fontRef>
-        </p:style>
-        <p:txBody>
-          <a:bodyPr rtlCol="0" anchor="ctr"/>
-          <a:lstStyle/>
-          <a:p>
-            <a:pPr algn="ctr"/>
-            <a:r>
-              <a:rPr lang="en-GB" b="1" dirty="0" err="1">
-                <a:solidFill>
-                  <a:schemeClr val="tx2"/>
-                </a:solidFill>
-              </a:rPr>
-              <a:t>Submesh</a:t>
-            </a:r>
-            <a:r>
-              <a:rPr lang="en-GB" b="1" dirty="0">
-                <a:solidFill>
-                  <a:schemeClr val="tx2"/>
-                </a:solidFill>
-              </a:rPr>
-              <a:t> 3</a:t>
-            </a:r>
-          </a:p>
-        </p:txBody>
-      </p:sp>
-      <p:sp>
-        <p:nvSpPr>
-          <p:cNvPr id="12" name="Rectangle: Rounded Corners 11">
-            <a:extLst>
-              <a:ext uri="{FF2B5EF4-FFF2-40B4-BE49-F238E27FC236}">
-                <a16:creationId xmlns:a16="http://schemas.microsoft.com/office/drawing/2014/main" id="{952C3D0D-6F3C-456B-8E53-E86F89829CF1}"/>
-              </a:ext>
-            </a:extLst>
-          </p:cNvPr>
-          <p:cNvSpPr/>
-          <p:nvPr/>
-        </p:nvSpPr>
-        <p:spPr>
-          <a:xfrm>
-            <a:off x="1331495" y="4229231"/>
-            <a:ext cx="1692442" cy="513346"/>
-          </a:xfrm>
-          <a:prstGeom prst="roundRect">
-            <a:avLst/>
-          </a:prstGeom>
-          <a:solidFill>
-            <a:schemeClr val="accent1">
-              <a:lumMod val="40000"/>
-              <a:lumOff val="60000"/>
-            </a:schemeClr>
-          </a:solidFill>
-        </p:spPr>
-        <p:style>
-          <a:lnRef idx="2">
-            <a:schemeClr val="accent1">
-              <a:shade val="50000"/>
-            </a:schemeClr>
-          </a:lnRef>
-          <a:fillRef idx="1">
-            <a:schemeClr val="accent1"/>
-          </a:fillRef>
-          <a:effectRef idx="0">
-            <a:schemeClr val="accent1"/>
-          </a:effectRef>
-          <a:fontRef idx="minor">
-            <a:schemeClr val="lt1"/>
-          </a:fontRef>
-        </p:style>
-        <p:txBody>
-          <a:bodyPr rtlCol="0" anchor="ctr"/>
-          <a:lstStyle/>
-          <a:p>
-            <a:pPr algn="ctr"/>
-            <a:r>
-              <a:rPr lang="en-GB" b="1" dirty="0" err="1">
-                <a:solidFill>
-                  <a:schemeClr val="tx2"/>
-                </a:solidFill>
-              </a:rPr>
-              <a:t>Submesh</a:t>
-            </a:r>
-            <a:r>
-              <a:rPr lang="en-GB" b="1" dirty="0">
-                <a:solidFill>
-                  <a:schemeClr val="tx2"/>
-                </a:solidFill>
-              </a:rPr>
-              <a:t> 4</a:t>
-            </a:r>
-          </a:p>
-        </p:txBody>
-      </p:sp>
-      <p:sp>
-        <p:nvSpPr>
-          <p:cNvPr id="13" name="Rectangle: Rounded Corners 12">
-            <a:extLst>
-              <a:ext uri="{FF2B5EF4-FFF2-40B4-BE49-F238E27FC236}">
-                <a16:creationId xmlns:a16="http://schemas.microsoft.com/office/drawing/2014/main" id="{CB734BFF-E232-47B0-A923-4DB40124C325}"/>
-              </a:ext>
-            </a:extLst>
-          </p:cNvPr>
-          <p:cNvSpPr/>
-          <p:nvPr/>
-        </p:nvSpPr>
-        <p:spPr>
-          <a:xfrm>
-            <a:off x="1331495" y="5078191"/>
-            <a:ext cx="1692442" cy="513346"/>
-          </a:xfrm>
-          <a:prstGeom prst="roundRect">
-            <a:avLst/>
-          </a:prstGeom>
-          <a:solidFill>
-            <a:schemeClr val="accent1">
-              <a:lumMod val="40000"/>
-              <a:lumOff val="60000"/>
-            </a:schemeClr>
-          </a:solidFill>
-        </p:spPr>
-        <p:style>
-          <a:lnRef idx="2">
-            <a:schemeClr val="accent1">
-              <a:shade val="50000"/>
-            </a:schemeClr>
-          </a:lnRef>
-          <a:fillRef idx="1">
-            <a:schemeClr val="accent1"/>
-          </a:fillRef>
-          <a:effectRef idx="0">
-            <a:schemeClr val="accent1"/>
-          </a:effectRef>
-          <a:fontRef idx="minor">
-            <a:schemeClr val="lt1"/>
-          </a:fontRef>
-        </p:style>
-        <p:txBody>
-          <a:bodyPr rtlCol="0" anchor="ctr"/>
-          <a:lstStyle/>
-          <a:p>
-            <a:pPr algn="ctr"/>
-            <a:r>
-              <a:rPr lang="en-GB" b="1" dirty="0" err="1">
-                <a:solidFill>
-                  <a:schemeClr val="tx2"/>
-                </a:solidFill>
-              </a:rPr>
-              <a:t>Submesh</a:t>
-            </a:r>
-            <a:r>
-              <a:rPr lang="en-GB" b="1" dirty="0">
-                <a:solidFill>
-                  <a:schemeClr val="tx2"/>
-                </a:solidFill>
-              </a:rPr>
-              <a:t> 5</a:t>
-            </a:r>
-          </a:p>
-        </p:txBody>
-      </p:sp>
-      <p:sp>
-        <p:nvSpPr>
-          <p:cNvPr id="14" name="Rectangle: Rounded Corners 13">
-            <a:extLst>
-              <a:ext uri="{FF2B5EF4-FFF2-40B4-BE49-F238E27FC236}">
-                <a16:creationId xmlns:a16="http://schemas.microsoft.com/office/drawing/2014/main" id="{CDF70A4A-AD09-4F68-9E76-59CFFBD99214}"/>
-              </a:ext>
-            </a:extLst>
-          </p:cNvPr>
-          <p:cNvSpPr/>
-          <p:nvPr/>
-        </p:nvSpPr>
-        <p:spPr>
-          <a:xfrm>
-            <a:off x="5446294" y="1673059"/>
-            <a:ext cx="1692442" cy="513346"/>
-          </a:xfrm>
-          <a:prstGeom prst="roundRect">
-            <a:avLst/>
-          </a:prstGeom>
-          <a:solidFill>
-            <a:schemeClr val="accent2">
-              <a:lumMod val="40000"/>
-              <a:lumOff val="60000"/>
-            </a:schemeClr>
-          </a:solidFill>
-        </p:spPr>
-        <p:style>
-          <a:lnRef idx="2">
-            <a:schemeClr val="accent1">
-              <a:shade val="50000"/>
-            </a:schemeClr>
-          </a:lnRef>
-          <a:fillRef idx="1">
-            <a:schemeClr val="accent1"/>
-          </a:fillRef>
-          <a:effectRef idx="0">
-            <a:schemeClr val="accent1"/>
-          </a:effectRef>
-          <a:fontRef idx="minor">
-            <a:schemeClr val="lt1"/>
-          </a:fontRef>
-        </p:style>
-        <p:txBody>
-          <a:bodyPr rtlCol="0" anchor="ctr"/>
-          <a:lstStyle/>
-          <a:p>
-            <a:pPr algn="ctr"/>
-            <a:r>
-              <a:rPr lang="en-GB" b="1" dirty="0">
-                <a:solidFill>
-                  <a:schemeClr val="tx2"/>
-                </a:solidFill>
-              </a:rPr>
-              <a:t>Material slot 1</a:t>
-            </a:r>
-          </a:p>
-        </p:txBody>
-      </p:sp>
-      <p:sp>
-        <p:nvSpPr>
-          <p:cNvPr id="19" name="Rectangle: Rounded Corners 18">
-            <a:extLst>
-              <a:ext uri="{FF2B5EF4-FFF2-40B4-BE49-F238E27FC236}">
-                <a16:creationId xmlns:a16="http://schemas.microsoft.com/office/drawing/2014/main" id="{6870E0A3-FFBF-40D6-B99F-6606DF5381FC}"/>
-              </a:ext>
-            </a:extLst>
-          </p:cNvPr>
-          <p:cNvSpPr/>
-          <p:nvPr/>
-        </p:nvSpPr>
-        <p:spPr>
-          <a:xfrm>
-            <a:off x="5446294" y="3375625"/>
-            <a:ext cx="1692442" cy="513346"/>
-          </a:xfrm>
-          <a:prstGeom prst="roundRect">
-            <a:avLst/>
-          </a:prstGeom>
-          <a:solidFill>
-            <a:schemeClr val="accent2">
-              <a:lumMod val="40000"/>
-              <a:lumOff val="60000"/>
-            </a:schemeClr>
-          </a:solidFill>
-        </p:spPr>
-        <p:style>
-          <a:lnRef idx="2">
-            <a:schemeClr val="accent1">
-              <a:shade val="50000"/>
-            </a:schemeClr>
-          </a:lnRef>
-          <a:fillRef idx="1">
-            <a:schemeClr val="accent1"/>
-          </a:fillRef>
-          <a:effectRef idx="0">
-            <a:schemeClr val="accent1"/>
-          </a:effectRef>
-          <a:fontRef idx="minor">
-            <a:schemeClr val="lt1"/>
-          </a:fontRef>
-        </p:style>
-        <p:txBody>
-          <a:bodyPr rtlCol="0" anchor="ctr"/>
-          <a:lstStyle/>
-          <a:p>
-            <a:pPr algn="ctr"/>
-            <a:r>
-              <a:rPr lang="en-GB" b="1" dirty="0">
-                <a:solidFill>
-                  <a:schemeClr val="tx2"/>
-                </a:solidFill>
-              </a:rPr>
-              <a:t>Material slot 2</a:t>
-            </a:r>
-          </a:p>
-        </p:txBody>
-      </p:sp>
-      <p:sp>
-        <p:nvSpPr>
-          <p:cNvPr id="20" name="Rectangle: Rounded Corners 19">
-            <a:extLst>
-              <a:ext uri="{FF2B5EF4-FFF2-40B4-BE49-F238E27FC236}">
-                <a16:creationId xmlns:a16="http://schemas.microsoft.com/office/drawing/2014/main" id="{E8BBC5F2-EC0C-4082-A059-23180EE1C54F}"/>
-              </a:ext>
-            </a:extLst>
-          </p:cNvPr>
-          <p:cNvSpPr/>
-          <p:nvPr/>
-        </p:nvSpPr>
-        <p:spPr>
-          <a:xfrm>
-            <a:off x="5446294" y="5078191"/>
-            <a:ext cx="1692442" cy="513346"/>
-          </a:xfrm>
-          <a:prstGeom prst="roundRect">
-            <a:avLst/>
-          </a:prstGeom>
-          <a:solidFill>
-            <a:schemeClr val="accent2">
-              <a:lumMod val="40000"/>
-              <a:lumOff val="60000"/>
-            </a:schemeClr>
-          </a:solidFill>
-        </p:spPr>
-        <p:style>
-          <a:lnRef idx="2">
-            <a:schemeClr val="accent1">
-              <a:shade val="50000"/>
-            </a:schemeClr>
-          </a:lnRef>
-          <a:fillRef idx="1">
-            <a:schemeClr val="accent1"/>
-          </a:fillRef>
-          <a:effectRef idx="0">
-            <a:schemeClr val="accent1"/>
-          </a:effectRef>
-          <a:fontRef idx="minor">
-            <a:schemeClr val="lt1"/>
-          </a:fontRef>
-        </p:style>
-        <p:txBody>
-          <a:bodyPr rtlCol="0" anchor="ctr"/>
-          <a:lstStyle/>
-          <a:p>
-            <a:pPr algn="ctr"/>
-            <a:r>
-              <a:rPr lang="en-GB" b="1" dirty="0">
-                <a:solidFill>
-                  <a:schemeClr val="tx2"/>
-                </a:solidFill>
-              </a:rPr>
-              <a:t>Material slot 3</a:t>
-            </a:r>
-          </a:p>
-        </p:txBody>
-      </p:sp>
-      <p:cxnSp>
-        <p:nvCxnSpPr>
-          <p:cNvPr id="31" name="Straight Connector 30">
-            <a:extLst>
-              <a:ext uri="{FF2B5EF4-FFF2-40B4-BE49-F238E27FC236}">
-                <a16:creationId xmlns:a16="http://schemas.microsoft.com/office/drawing/2014/main" id="{F3A2632C-5E21-486D-9B1F-2F4E692A9683}"/>
-              </a:ext>
-            </a:extLst>
-          </p:cNvPr>
-          <p:cNvCxnSpPr>
-            <a:cxnSpLocks/>
-            <a:stCxn id="9" idx="3"/>
-            <a:endCxn id="19" idx="1"/>
-          </p:cNvCxnSpPr>
-          <p:nvPr/>
-        </p:nvCxnSpPr>
-        <p:spPr>
-          <a:xfrm>
-            <a:off x="3023936" y="1929732"/>
-            <a:ext cx="2422358" cy="1702566"/>
-          </a:xfrm>
-          <a:prstGeom prst="line">
-            <a:avLst/>
-          </a:prstGeom>
-          <a:ln/>
-        </p:spPr>
-        <p:style>
-          <a:lnRef idx="1">
-            <a:schemeClr val="accent1"/>
-          </a:lnRef>
-          <a:fillRef idx="0">
-            <a:schemeClr val="accent1"/>
-          </a:fillRef>
-          <a:effectRef idx="0">
-            <a:schemeClr val="accent1"/>
-          </a:effectRef>
-          <a:fontRef idx="minor">
-            <a:schemeClr val="tx1"/>
-          </a:fontRef>
-        </p:style>
-      </p:cxnSp>
-      <p:cxnSp>
-        <p:nvCxnSpPr>
-          <p:cNvPr id="38" name="Straight Connector 37">
-            <a:extLst>
-              <a:ext uri="{FF2B5EF4-FFF2-40B4-BE49-F238E27FC236}">
-                <a16:creationId xmlns:a16="http://schemas.microsoft.com/office/drawing/2014/main" id="{03446A35-4FD5-49D0-B74C-73A03ABDEA19}"/>
-              </a:ext>
-            </a:extLst>
-          </p:cNvPr>
-          <p:cNvCxnSpPr>
-            <a:cxnSpLocks/>
-            <a:stCxn id="10" idx="3"/>
-            <a:endCxn id="20" idx="1"/>
-          </p:cNvCxnSpPr>
-          <p:nvPr/>
-        </p:nvCxnSpPr>
-        <p:spPr>
-          <a:xfrm>
-            <a:off x="3023937" y="2783338"/>
-            <a:ext cx="2422357" cy="2551526"/>
-          </a:xfrm>
-          <a:prstGeom prst="line">
-            <a:avLst/>
-          </a:prstGeom>
-          <a:ln/>
-        </p:spPr>
-        <p:style>
-          <a:lnRef idx="1">
-            <a:schemeClr val="accent1"/>
-          </a:lnRef>
-          <a:fillRef idx="0">
-            <a:schemeClr val="accent1"/>
-          </a:fillRef>
-          <a:effectRef idx="0">
-            <a:schemeClr val="accent1"/>
-          </a:effectRef>
-          <a:fontRef idx="minor">
-            <a:schemeClr val="tx1"/>
-          </a:fontRef>
-        </p:style>
-      </p:cxnSp>
-      <p:cxnSp>
-        <p:nvCxnSpPr>
-          <p:cNvPr id="40" name="Straight Connector 39">
-            <a:extLst>
-              <a:ext uri="{FF2B5EF4-FFF2-40B4-BE49-F238E27FC236}">
-                <a16:creationId xmlns:a16="http://schemas.microsoft.com/office/drawing/2014/main" id="{CAFB3211-0335-4C98-B7C5-F898F192BADE}"/>
-              </a:ext>
-            </a:extLst>
-          </p:cNvPr>
-          <p:cNvCxnSpPr>
-            <a:cxnSpLocks/>
-            <a:stCxn id="13" idx="3"/>
-            <a:endCxn id="20" idx="1"/>
-          </p:cNvCxnSpPr>
-          <p:nvPr/>
-        </p:nvCxnSpPr>
-        <p:spPr>
-          <a:xfrm>
-            <a:off x="3023937" y="5334864"/>
-            <a:ext cx="2422357" cy="0"/>
-          </a:xfrm>
-          <a:prstGeom prst="line">
-            <a:avLst/>
-          </a:prstGeom>
-          <a:ln/>
-        </p:spPr>
-        <p:style>
-          <a:lnRef idx="1">
-            <a:schemeClr val="accent1"/>
-          </a:lnRef>
-          <a:fillRef idx="0">
-            <a:schemeClr val="accent1"/>
-          </a:fillRef>
-          <a:effectRef idx="0">
-            <a:schemeClr val="accent1"/>
-          </a:effectRef>
-          <a:fontRef idx="minor">
-            <a:schemeClr val="tx1"/>
-          </a:fontRef>
-        </p:style>
-      </p:cxnSp>
-      <p:cxnSp>
-        <p:nvCxnSpPr>
-          <p:cNvPr id="43" name="Straight Connector 42">
-            <a:extLst>
-              <a:ext uri="{FF2B5EF4-FFF2-40B4-BE49-F238E27FC236}">
-                <a16:creationId xmlns:a16="http://schemas.microsoft.com/office/drawing/2014/main" id="{1CAA2E84-4824-4703-A567-D6E766FDEB18}"/>
-              </a:ext>
-            </a:extLst>
-          </p:cNvPr>
-          <p:cNvCxnSpPr>
-            <a:cxnSpLocks/>
-            <a:endCxn id="14" idx="1"/>
-          </p:cNvCxnSpPr>
-          <p:nvPr/>
-        </p:nvCxnSpPr>
-        <p:spPr>
-          <a:xfrm flipV="1">
-            <a:off x="3023936" y="1929732"/>
-            <a:ext cx="2422358" cy="2501084"/>
-          </a:xfrm>
-          <a:prstGeom prst="line">
-            <a:avLst/>
-          </a:prstGeom>
-          <a:ln/>
-        </p:spPr>
-        <p:style>
-          <a:lnRef idx="1">
-            <a:schemeClr val="accent1"/>
-          </a:lnRef>
-          <a:fillRef idx="0">
-            <a:schemeClr val="accent1"/>
-          </a:fillRef>
-          <a:effectRef idx="0">
-            <a:schemeClr val="accent1"/>
-          </a:effectRef>
-          <a:fontRef idx="minor">
-            <a:schemeClr val="tx1"/>
-          </a:fontRef>
-        </p:style>
-      </p:cxnSp>
-      <p:cxnSp>
-        <p:nvCxnSpPr>
-          <p:cNvPr id="45" name="Straight Connector 44">
-            <a:extLst>
-              <a:ext uri="{FF2B5EF4-FFF2-40B4-BE49-F238E27FC236}">
-                <a16:creationId xmlns:a16="http://schemas.microsoft.com/office/drawing/2014/main" id="{0992E2A4-1752-457E-882F-9802764B02F5}"/>
-              </a:ext>
-            </a:extLst>
-          </p:cNvPr>
-          <p:cNvCxnSpPr>
-            <a:cxnSpLocks/>
-            <a:stCxn id="11" idx="3"/>
-            <a:endCxn id="19" idx="1"/>
-          </p:cNvCxnSpPr>
-          <p:nvPr/>
-        </p:nvCxnSpPr>
-        <p:spPr>
-          <a:xfrm>
-            <a:off x="3023937" y="3632298"/>
-            <a:ext cx="2422357" cy="0"/>
-          </a:xfrm>
-          <a:prstGeom prst="line">
-            <a:avLst/>
-          </a:prstGeom>
-          <a:ln/>
-        </p:spPr>
-        <p:style>
-          <a:lnRef idx="1">
-            <a:schemeClr val="accent1"/>
-          </a:lnRef>
-          <a:fillRef idx="0">
-            <a:schemeClr val="accent1"/>
-          </a:fillRef>
-          <a:effectRef idx="0">
-            <a:schemeClr val="accent1"/>
-          </a:effectRef>
-          <a:fontRef idx="minor">
-            <a:schemeClr val="tx1"/>
-          </a:fontRef>
-        </p:style>
-      </p:cxnSp>
-      <p:sp>
-        <p:nvSpPr>
-          <p:cNvPr id="54" name="TextBox 53">
-            <a:extLst>
-              <a:ext uri="{FF2B5EF4-FFF2-40B4-BE49-F238E27FC236}">
-                <a16:creationId xmlns:a16="http://schemas.microsoft.com/office/drawing/2014/main" id="{366E36D5-7E2E-406A-AB67-FB8A8580CD76}"/>
-              </a:ext>
-            </a:extLst>
-          </p:cNvPr>
-          <p:cNvSpPr txBox="1"/>
-          <p:nvPr/>
-        </p:nvSpPr>
-        <p:spPr>
-          <a:xfrm>
-            <a:off x="2495215" y="910264"/>
-            <a:ext cx="5226384" cy="461665"/>
-          </a:xfrm>
-          <a:prstGeom prst="rect">
-            <a:avLst/>
-          </a:prstGeom>
-          <a:noFill/>
-        </p:spPr>
-        <p:txBody>
-          <a:bodyPr wrap="square" rtlCol="0">
-            <a:spAutoFit/>
-          </a:bodyPr>
-          <a:lstStyle/>
-          <a:p>
-            <a:r>
-              <a:rPr lang="en-GB" sz="2400" dirty="0"/>
-              <a:t>Before merging </a:t>
-            </a:r>
-            <a:r>
-              <a:rPr lang="en-GB" sz="2400" dirty="0" err="1"/>
-              <a:t>submeshes</a:t>
-            </a:r>
-            <a:endParaRPr lang="en-GB" sz="2400" dirty="0"/>
+              <a:t>After merging</a:t>
+            </a:r>
           </a:p>
         </p:txBody>
       </p:sp>
@@ -6476,575 +5742,6 @@
     <p:extLst>
       <p:ext uri="{BB962C8B-B14F-4D97-AF65-F5344CB8AC3E}">
         <p14:creationId xmlns:p14="http://schemas.microsoft.com/office/powerpoint/2010/main" val="1246102951"/>
-      </p:ext>
-    </p:extLst>
-  </p:cSld>
-  <p:clrMapOvr>
-    <a:masterClrMapping/>
-  </p:clrMapOvr>
-</p:sld>
-</file>
-
-<file path=ppt/slides/slide4.xml><?xml version="1.0" encoding="utf-8"?>
-<p:sld xmlns:a="http://schemas.openxmlformats.org/drawingml/2006/main" xmlns:r="http://schemas.openxmlformats.org/officeDocument/2006/relationships" xmlns:p="http://schemas.openxmlformats.org/presentationml/2006/main">
-  <p:cSld>
-    <p:spTree>
-      <p:nvGrpSpPr>
-        <p:cNvPr id="1" name=""/>
-        <p:cNvGrpSpPr/>
-        <p:nvPr/>
-      </p:nvGrpSpPr>
-      <p:grpSpPr>
-        <a:xfrm>
-          <a:off x="0" y="0"/>
-          <a:ext cx="0" cy="0"/>
-          <a:chOff x="0" y="0"/>
-          <a:chExt cx="0" cy="0"/>
-        </a:xfrm>
-      </p:grpSpPr>
-      <p:sp>
-        <p:nvSpPr>
-          <p:cNvPr id="12" name="Rectangle: Rounded Corners 11">
-            <a:extLst>
-              <a:ext uri="{FF2B5EF4-FFF2-40B4-BE49-F238E27FC236}">
-                <a16:creationId xmlns:a16="http://schemas.microsoft.com/office/drawing/2014/main" id="{952C3D0D-6F3C-456B-8E53-E86F89829CF1}"/>
-              </a:ext>
-            </a:extLst>
-          </p:cNvPr>
-          <p:cNvSpPr/>
-          <p:nvPr/>
-        </p:nvSpPr>
-        <p:spPr>
-          <a:xfrm>
-            <a:off x="1344195" y="4112258"/>
-            <a:ext cx="1692442" cy="770019"/>
-          </a:xfrm>
-          <a:prstGeom prst="roundRect">
-            <a:avLst/>
-          </a:prstGeom>
-          <a:solidFill>
-            <a:schemeClr val="accent1">
-              <a:lumMod val="40000"/>
-              <a:lumOff val="60000"/>
-            </a:schemeClr>
-          </a:solidFill>
-        </p:spPr>
-        <p:style>
-          <a:lnRef idx="2">
-            <a:schemeClr val="accent1">
-              <a:shade val="50000"/>
-            </a:schemeClr>
-          </a:lnRef>
-          <a:fillRef idx="1">
-            <a:schemeClr val="accent1"/>
-          </a:fillRef>
-          <a:effectRef idx="0">
-            <a:schemeClr val="accent1"/>
-          </a:effectRef>
-          <a:fontRef idx="minor">
-            <a:schemeClr val="lt1"/>
-          </a:fontRef>
-        </p:style>
-        <p:txBody>
-          <a:bodyPr rtlCol="0" anchor="ctr"/>
-          <a:lstStyle/>
-          <a:p>
-            <a:pPr algn="ctr"/>
-            <a:r>
-              <a:rPr lang="en-GB" b="1" dirty="0" err="1">
-                <a:solidFill>
-                  <a:schemeClr val="tx2"/>
-                </a:solidFill>
-              </a:rPr>
-              <a:t>Submesh</a:t>
-            </a:r>
-            <a:r>
-              <a:rPr lang="en-GB" b="1" dirty="0">
-                <a:solidFill>
-                  <a:schemeClr val="tx2"/>
-                </a:solidFill>
-              </a:rPr>
-              <a:t> 3 (merged)</a:t>
-            </a:r>
-          </a:p>
-        </p:txBody>
-      </p:sp>
-      <p:sp>
-        <p:nvSpPr>
-          <p:cNvPr id="14" name="Rectangle: Rounded Corners 13">
-            <a:extLst>
-              <a:ext uri="{FF2B5EF4-FFF2-40B4-BE49-F238E27FC236}">
-                <a16:creationId xmlns:a16="http://schemas.microsoft.com/office/drawing/2014/main" id="{CDF70A4A-AD09-4F68-9E76-59CFFBD99214}"/>
-              </a:ext>
-            </a:extLst>
-          </p:cNvPr>
-          <p:cNvSpPr/>
-          <p:nvPr/>
-        </p:nvSpPr>
-        <p:spPr>
-          <a:xfrm>
-            <a:off x="5458992" y="1864383"/>
-            <a:ext cx="1692442" cy="513346"/>
-          </a:xfrm>
-          <a:prstGeom prst="roundRect">
-            <a:avLst/>
-          </a:prstGeom>
-          <a:solidFill>
-            <a:schemeClr val="accent2">
-              <a:lumMod val="40000"/>
-              <a:lumOff val="60000"/>
-            </a:schemeClr>
-          </a:solidFill>
-        </p:spPr>
-        <p:style>
-          <a:lnRef idx="2">
-            <a:schemeClr val="accent1">
-              <a:shade val="50000"/>
-            </a:schemeClr>
-          </a:lnRef>
-          <a:fillRef idx="1">
-            <a:schemeClr val="accent1"/>
-          </a:fillRef>
-          <a:effectRef idx="0">
-            <a:schemeClr val="accent1"/>
-          </a:effectRef>
-          <a:fontRef idx="minor">
-            <a:schemeClr val="lt1"/>
-          </a:fontRef>
-        </p:style>
-        <p:txBody>
-          <a:bodyPr rtlCol="0" anchor="ctr"/>
-          <a:lstStyle/>
-          <a:p>
-            <a:pPr algn="ctr"/>
-            <a:r>
-              <a:rPr lang="en-GB" b="1" dirty="0">
-                <a:solidFill>
-                  <a:schemeClr val="tx2"/>
-                </a:solidFill>
-              </a:rPr>
-              <a:t>Material slot 1</a:t>
-            </a:r>
-          </a:p>
-        </p:txBody>
-      </p:sp>
-      <p:sp>
-        <p:nvSpPr>
-          <p:cNvPr id="19" name="Rectangle: Rounded Corners 18">
-            <a:extLst>
-              <a:ext uri="{FF2B5EF4-FFF2-40B4-BE49-F238E27FC236}">
-                <a16:creationId xmlns:a16="http://schemas.microsoft.com/office/drawing/2014/main" id="{6870E0A3-FFBF-40D6-B99F-6606DF5381FC}"/>
-              </a:ext>
-            </a:extLst>
-          </p:cNvPr>
-          <p:cNvSpPr/>
-          <p:nvPr/>
-        </p:nvSpPr>
-        <p:spPr>
-          <a:xfrm>
-            <a:off x="5458994" y="3063301"/>
-            <a:ext cx="1692442" cy="513346"/>
-          </a:xfrm>
-          <a:prstGeom prst="roundRect">
-            <a:avLst/>
-          </a:prstGeom>
-          <a:solidFill>
-            <a:schemeClr val="accent2">
-              <a:lumMod val="40000"/>
-              <a:lumOff val="60000"/>
-            </a:schemeClr>
-          </a:solidFill>
-        </p:spPr>
-        <p:style>
-          <a:lnRef idx="2">
-            <a:schemeClr val="accent1">
-              <a:shade val="50000"/>
-            </a:schemeClr>
-          </a:lnRef>
-          <a:fillRef idx="1">
-            <a:schemeClr val="accent1"/>
-          </a:fillRef>
-          <a:effectRef idx="0">
-            <a:schemeClr val="accent1"/>
-          </a:effectRef>
-          <a:fontRef idx="minor">
-            <a:schemeClr val="lt1"/>
-          </a:fontRef>
-        </p:style>
-        <p:txBody>
-          <a:bodyPr rtlCol="0" anchor="ctr"/>
-          <a:lstStyle/>
-          <a:p>
-            <a:pPr algn="ctr"/>
-            <a:r>
-              <a:rPr lang="en-GB" b="1" dirty="0">
-                <a:solidFill>
-                  <a:schemeClr val="tx2"/>
-                </a:solidFill>
-              </a:rPr>
-              <a:t>Material slot 2</a:t>
-            </a:r>
-          </a:p>
-        </p:txBody>
-      </p:sp>
-      <p:sp>
-        <p:nvSpPr>
-          <p:cNvPr id="20" name="Rectangle: Rounded Corners 19">
-            <a:extLst>
-              <a:ext uri="{FF2B5EF4-FFF2-40B4-BE49-F238E27FC236}">
-                <a16:creationId xmlns:a16="http://schemas.microsoft.com/office/drawing/2014/main" id="{E8BBC5F2-EC0C-4082-A059-23180EE1C54F}"/>
-              </a:ext>
-            </a:extLst>
-          </p:cNvPr>
-          <p:cNvSpPr/>
-          <p:nvPr/>
-        </p:nvSpPr>
-        <p:spPr>
-          <a:xfrm>
-            <a:off x="5458994" y="4240594"/>
-            <a:ext cx="1692442" cy="513346"/>
-          </a:xfrm>
-          <a:prstGeom prst="roundRect">
-            <a:avLst/>
-          </a:prstGeom>
-          <a:solidFill>
-            <a:schemeClr val="accent2">
-              <a:lumMod val="40000"/>
-              <a:lumOff val="60000"/>
-            </a:schemeClr>
-          </a:solidFill>
-        </p:spPr>
-        <p:style>
-          <a:lnRef idx="2">
-            <a:schemeClr val="accent1">
-              <a:shade val="50000"/>
-            </a:schemeClr>
-          </a:lnRef>
-          <a:fillRef idx="1">
-            <a:schemeClr val="accent1"/>
-          </a:fillRef>
-          <a:effectRef idx="0">
-            <a:schemeClr val="accent1"/>
-          </a:effectRef>
-          <a:fontRef idx="minor">
-            <a:schemeClr val="lt1"/>
-          </a:fontRef>
-        </p:style>
-        <p:txBody>
-          <a:bodyPr rtlCol="0" anchor="ctr"/>
-          <a:lstStyle/>
-          <a:p>
-            <a:pPr algn="ctr"/>
-            <a:r>
-              <a:rPr lang="en-GB" b="1" dirty="0">
-                <a:solidFill>
-                  <a:schemeClr val="tx2"/>
-                </a:solidFill>
-              </a:rPr>
-              <a:t>Material slot 3</a:t>
-            </a:r>
-          </a:p>
-        </p:txBody>
-      </p:sp>
-      <p:cxnSp>
-        <p:nvCxnSpPr>
-          <p:cNvPr id="43" name="Straight Connector 42">
-            <a:extLst>
-              <a:ext uri="{FF2B5EF4-FFF2-40B4-BE49-F238E27FC236}">
-                <a16:creationId xmlns:a16="http://schemas.microsoft.com/office/drawing/2014/main" id="{1CAA2E84-4824-4703-A567-D6E766FDEB18}"/>
-              </a:ext>
-            </a:extLst>
-          </p:cNvPr>
-          <p:cNvCxnSpPr>
-            <a:cxnSpLocks/>
-            <a:endCxn id="14" idx="1"/>
-          </p:cNvCxnSpPr>
-          <p:nvPr/>
-        </p:nvCxnSpPr>
-        <p:spPr>
-          <a:xfrm flipV="1">
-            <a:off x="3036634" y="2121056"/>
-            <a:ext cx="2422358" cy="2501084"/>
-          </a:xfrm>
-          <a:prstGeom prst="line">
-            <a:avLst/>
-          </a:prstGeom>
-          <a:ln/>
-        </p:spPr>
-        <p:style>
-          <a:lnRef idx="1">
-            <a:schemeClr val="accent1"/>
-          </a:lnRef>
-          <a:fillRef idx="0">
-            <a:schemeClr val="accent1"/>
-          </a:fillRef>
-          <a:effectRef idx="0">
-            <a:schemeClr val="accent1"/>
-          </a:effectRef>
-          <a:fontRef idx="minor">
-            <a:schemeClr val="tx1"/>
-          </a:fontRef>
-        </p:style>
-      </p:cxnSp>
-      <p:sp>
-        <p:nvSpPr>
-          <p:cNvPr id="54" name="TextBox 53">
-            <a:extLst>
-              <a:ext uri="{FF2B5EF4-FFF2-40B4-BE49-F238E27FC236}">
-                <a16:creationId xmlns:a16="http://schemas.microsoft.com/office/drawing/2014/main" id="{366E36D5-7E2E-406A-AB67-FB8A8580CD76}"/>
-              </a:ext>
-            </a:extLst>
-          </p:cNvPr>
-          <p:cNvSpPr txBox="1"/>
-          <p:nvPr/>
-        </p:nvSpPr>
-        <p:spPr>
-          <a:xfrm>
-            <a:off x="2711115" y="962729"/>
-            <a:ext cx="5226384" cy="461665"/>
-          </a:xfrm>
-          <a:prstGeom prst="rect">
-            <a:avLst/>
-          </a:prstGeom>
-          <a:noFill/>
-        </p:spPr>
-        <p:txBody>
-          <a:bodyPr wrap="square" rtlCol="0">
-            <a:spAutoFit/>
-          </a:bodyPr>
-          <a:lstStyle/>
-          <a:p>
-            <a:r>
-              <a:rPr lang="en-GB" sz="2400" dirty="0"/>
-              <a:t>After merging </a:t>
-            </a:r>
-            <a:r>
-              <a:rPr lang="en-GB" sz="2400" dirty="0" err="1"/>
-              <a:t>submeshes</a:t>
-            </a:r>
-            <a:endParaRPr lang="en-GB" sz="2400" dirty="0"/>
-          </a:p>
-        </p:txBody>
-      </p:sp>
-      <p:sp>
-        <p:nvSpPr>
-          <p:cNvPr id="17" name="Rectangle: Rounded Corners 16">
-            <a:extLst>
-              <a:ext uri="{FF2B5EF4-FFF2-40B4-BE49-F238E27FC236}">
-                <a16:creationId xmlns:a16="http://schemas.microsoft.com/office/drawing/2014/main" id="{EEBADA02-0A2E-4897-BD2C-7A9253BDA007}"/>
-              </a:ext>
-            </a:extLst>
-          </p:cNvPr>
-          <p:cNvSpPr/>
-          <p:nvPr/>
-        </p:nvSpPr>
-        <p:spPr>
-          <a:xfrm>
-            <a:off x="1344195" y="1729172"/>
-            <a:ext cx="1692442" cy="770019"/>
-          </a:xfrm>
-          <a:prstGeom prst="roundRect">
-            <a:avLst/>
-          </a:prstGeom>
-          <a:solidFill>
-            <a:schemeClr val="accent1">
-              <a:lumMod val="40000"/>
-              <a:lumOff val="60000"/>
-            </a:schemeClr>
-          </a:solidFill>
-        </p:spPr>
-        <p:style>
-          <a:lnRef idx="2">
-            <a:schemeClr val="accent1">
-              <a:shade val="50000"/>
-            </a:schemeClr>
-          </a:lnRef>
-          <a:fillRef idx="1">
-            <a:schemeClr val="accent1"/>
-          </a:fillRef>
-          <a:effectRef idx="0">
-            <a:schemeClr val="accent1"/>
-          </a:effectRef>
-          <a:fontRef idx="minor">
-            <a:schemeClr val="lt1"/>
-          </a:fontRef>
-        </p:style>
-        <p:txBody>
-          <a:bodyPr rtlCol="0" anchor="ctr"/>
-          <a:lstStyle/>
-          <a:p>
-            <a:pPr algn="ctr"/>
-            <a:r>
-              <a:rPr lang="en-GB" b="1" dirty="0" err="1">
-                <a:solidFill>
-                  <a:schemeClr val="tx2"/>
-                </a:solidFill>
-              </a:rPr>
-              <a:t>Submesh</a:t>
-            </a:r>
-            <a:r>
-              <a:rPr lang="en-GB" b="1" dirty="0">
-                <a:solidFill>
-                  <a:schemeClr val="tx2"/>
-                </a:solidFill>
-              </a:rPr>
-              <a:t> 1 (merged)</a:t>
-            </a:r>
-          </a:p>
-        </p:txBody>
-      </p:sp>
-      <p:sp>
-        <p:nvSpPr>
-          <p:cNvPr id="18" name="Rectangle: Rounded Corners 17">
-            <a:extLst>
-              <a:ext uri="{FF2B5EF4-FFF2-40B4-BE49-F238E27FC236}">
-                <a16:creationId xmlns:a16="http://schemas.microsoft.com/office/drawing/2014/main" id="{2B4BB5AF-4F83-4DB0-B2E9-A1FD3DEC482D}"/>
-              </a:ext>
-            </a:extLst>
-          </p:cNvPr>
-          <p:cNvSpPr/>
-          <p:nvPr/>
-        </p:nvSpPr>
-        <p:spPr>
-          <a:xfrm>
-            <a:off x="1344193" y="2940657"/>
-            <a:ext cx="1692442" cy="770019"/>
-          </a:xfrm>
-          <a:prstGeom prst="roundRect">
-            <a:avLst/>
-          </a:prstGeom>
-          <a:solidFill>
-            <a:schemeClr val="accent1">
-              <a:lumMod val="40000"/>
-              <a:lumOff val="60000"/>
-            </a:schemeClr>
-          </a:solidFill>
-        </p:spPr>
-        <p:style>
-          <a:lnRef idx="2">
-            <a:schemeClr val="accent1">
-              <a:shade val="50000"/>
-            </a:schemeClr>
-          </a:lnRef>
-          <a:fillRef idx="1">
-            <a:schemeClr val="accent1"/>
-          </a:fillRef>
-          <a:effectRef idx="0">
-            <a:schemeClr val="accent1"/>
-          </a:effectRef>
-          <a:fontRef idx="minor">
-            <a:schemeClr val="lt1"/>
-          </a:fontRef>
-        </p:style>
-        <p:txBody>
-          <a:bodyPr rtlCol="0" anchor="ctr"/>
-          <a:lstStyle/>
-          <a:p>
-            <a:pPr algn="ctr"/>
-            <a:r>
-              <a:rPr lang="en-GB" b="1" dirty="0" err="1">
-                <a:solidFill>
-                  <a:schemeClr val="tx2"/>
-                </a:solidFill>
-              </a:rPr>
-              <a:t>Submesh</a:t>
-            </a:r>
-            <a:r>
-              <a:rPr lang="en-GB" b="1" dirty="0">
-                <a:solidFill>
-                  <a:schemeClr val="tx2"/>
-                </a:solidFill>
-              </a:rPr>
-              <a:t> 2 (merged)</a:t>
-            </a:r>
-          </a:p>
-        </p:txBody>
-      </p:sp>
-      <p:cxnSp>
-        <p:nvCxnSpPr>
-          <p:cNvPr id="21" name="Straight Connector 20">
-            <a:extLst>
-              <a:ext uri="{FF2B5EF4-FFF2-40B4-BE49-F238E27FC236}">
-                <a16:creationId xmlns:a16="http://schemas.microsoft.com/office/drawing/2014/main" id="{322A8324-54F6-49AF-8783-1D38E038B39D}"/>
-              </a:ext>
-            </a:extLst>
-          </p:cNvPr>
-          <p:cNvCxnSpPr>
-            <a:cxnSpLocks/>
-            <a:stCxn id="17" idx="3"/>
-            <a:endCxn id="19" idx="1"/>
-          </p:cNvCxnSpPr>
-          <p:nvPr/>
-        </p:nvCxnSpPr>
-        <p:spPr>
-          <a:xfrm>
-            <a:off x="3036637" y="2114182"/>
-            <a:ext cx="2422357" cy="1205792"/>
-          </a:xfrm>
-          <a:prstGeom prst="line">
-            <a:avLst/>
-          </a:prstGeom>
-          <a:ln/>
-        </p:spPr>
-        <p:style>
-          <a:lnRef idx="1">
-            <a:schemeClr val="accent1"/>
-          </a:lnRef>
-          <a:fillRef idx="0">
-            <a:schemeClr val="accent1"/>
-          </a:fillRef>
-          <a:effectRef idx="0">
-            <a:schemeClr val="accent1"/>
-          </a:effectRef>
-          <a:fontRef idx="minor">
-            <a:schemeClr val="tx1"/>
-          </a:fontRef>
-        </p:style>
-      </p:cxnSp>
-      <p:cxnSp>
-        <p:nvCxnSpPr>
-          <p:cNvPr id="22" name="Straight Connector 21">
-            <a:extLst>
-              <a:ext uri="{FF2B5EF4-FFF2-40B4-BE49-F238E27FC236}">
-                <a16:creationId xmlns:a16="http://schemas.microsoft.com/office/drawing/2014/main" id="{D5F3E433-2A77-40DB-8FB7-9AB6AD94F7E1}"/>
-              </a:ext>
-            </a:extLst>
-          </p:cNvPr>
-          <p:cNvCxnSpPr>
-            <a:cxnSpLocks/>
-            <a:stCxn id="18" idx="3"/>
-          </p:cNvCxnSpPr>
-          <p:nvPr/>
-        </p:nvCxnSpPr>
-        <p:spPr>
-          <a:xfrm>
-            <a:off x="3036635" y="3325667"/>
-            <a:ext cx="2422355" cy="1160574"/>
-          </a:xfrm>
-          <a:prstGeom prst="line">
-            <a:avLst/>
-          </a:prstGeom>
-          <a:ln/>
-        </p:spPr>
-        <p:style>
-          <a:lnRef idx="1">
-            <a:schemeClr val="accent1"/>
-          </a:lnRef>
-          <a:fillRef idx="0">
-            <a:schemeClr val="accent1"/>
-          </a:fillRef>
-          <a:effectRef idx="0">
-            <a:schemeClr val="accent1"/>
-          </a:effectRef>
-          <a:fontRef idx="minor">
-            <a:schemeClr val="tx1"/>
-          </a:fontRef>
-        </p:style>
-      </p:cxnSp>
-    </p:spTree>
-    <p:extLst>
-      <p:ext uri="{BB962C8B-B14F-4D97-AF65-F5344CB8AC3E}">
-        <p14:creationId xmlns:p14="http://schemas.microsoft.com/office/powerpoint/2010/main" val="2452275026"/>
       </p:ext>
     </p:extLst>
   </p:cSld>

</xml_diff>